<commit_message>
Working on regularization paths
</commit_message>
<xml_diff>
--- a/Figures/ApproxEstError/approx-est-opt-error.pptx
+++ b/Figures/ApproxEstError/approx-est-opt-error.pptx
@@ -5,22 +5,17 @@
     <p:sldMasterId id="2147483648" r:id="rId4"/>
   </p:sldMasterIdLst>
   <p:notesMasterIdLst>
-    <p:notesMasterId r:id="rId15"/>
+    <p:notesMasterId r:id="rId10"/>
   </p:notesMasterIdLst>
   <p:handoutMasterIdLst>
-    <p:handoutMasterId r:id="rId16"/>
+    <p:handoutMasterId r:id="rId11"/>
   </p:handoutMasterIdLst>
   <p:sldIdLst>
-    <p:sldId id="259" r:id="rId5"/>
-    <p:sldId id="258" r:id="rId6"/>
-    <p:sldId id="261" r:id="rId7"/>
-    <p:sldId id="262" r:id="rId8"/>
-    <p:sldId id="263" r:id="rId9"/>
-    <p:sldId id="264" r:id="rId10"/>
-    <p:sldId id="265" r:id="rId11"/>
-    <p:sldId id="266" r:id="rId12"/>
-    <p:sldId id="260" r:id="rId13"/>
-    <p:sldId id="256" r:id="rId14"/>
+    <p:sldId id="258" r:id="rId5"/>
+    <p:sldId id="263" r:id="rId6"/>
+    <p:sldId id="264" r:id="rId7"/>
+    <p:sldId id="265" r:id="rId8"/>
+    <p:sldId id="266" r:id="rId9"/>
   </p:sldIdLst>
   <p:sldSz cx="12188825" cy="6858000"/>
   <p:notesSz cx="7010400" cy="9296400"/>
@@ -248,7 +243,7 @@
             <a:fld id="{D5BD78FF-B1C8-3E4D-A610-8CC16E4B3835}" type="datetimeFigureOut">
               <a:rPr lang="en-US" smtClean="0"/>
               <a:pPr/>
-              <a:t>10/4/17</a:t>
+              <a:t>1/20/18</a:t>
             </a:fld>
             <a:endParaRPr lang="en-US"/>
           </a:p>
@@ -415,7 +410,7 @@
             <a:fld id="{214C08B1-0926-46EB-A72C-6066AF429DCA}" type="datetimeFigureOut">
               <a:rPr lang="en-US" smtClean="0"/>
               <a:pPr/>
-              <a:t>10/4/17</a:t>
+              <a:t>1/20/18</a:t>
             </a:fld>
             <a:endParaRPr lang="en-US"/>
           </a:p>
@@ -15341,511 +15336,6 @@
 <file path=ppt/slides/slide1.xml><?xml version="1.0" encoding="utf-8"?>
 <p:sld xmlns:a="http://schemas.openxmlformats.org/drawingml/2006/main" xmlns:r="http://schemas.openxmlformats.org/officeDocument/2006/relationships" xmlns:p="http://schemas.openxmlformats.org/presentationml/2006/main">
   <p:cSld>
-    <p:spTree>
-      <p:nvGrpSpPr>
-        <p:cNvPr id="1" name=""/>
-        <p:cNvGrpSpPr/>
-        <p:nvPr/>
-      </p:nvGrpSpPr>
-      <p:grpSpPr>
-        <a:xfrm>
-          <a:off x="0" y="0"/>
-          <a:ext cx="0" cy="0"/>
-          <a:chOff x="0" y="0"/>
-          <a:chExt cx="0" cy="0"/>
-        </a:xfrm>
-      </p:grpSpPr>
-    </p:spTree>
-    <p:extLst>
-      <p:ext uri="{BB962C8B-B14F-4D97-AF65-F5344CB8AC3E}">
-        <p14:creationId xmlns:p14="http://schemas.microsoft.com/office/powerpoint/2010/main" val="1682311502"/>
-      </p:ext>
-    </p:extLst>
-  </p:cSld>
-  <p:clrMapOvr>
-    <a:masterClrMapping/>
-  </p:clrMapOvr>
-  <p:timing>
-    <p:tnLst>
-      <p:par>
-        <p:cTn id="1" dur="indefinite" restart="never" nodeType="tmRoot"/>
-      </p:par>
-    </p:tnLst>
-  </p:timing>
-</p:sld>
-</file>
-
-<file path=ppt/slides/slide10.xml><?xml version="1.0" encoding="utf-8"?>
-<p:sld xmlns:a="http://schemas.openxmlformats.org/drawingml/2006/main" xmlns:r="http://schemas.openxmlformats.org/officeDocument/2006/relationships" xmlns:p="http://schemas.openxmlformats.org/presentationml/2006/main">
-  <p:cSld>
-    <p:spTree>
-      <p:nvGrpSpPr>
-        <p:cNvPr id="1" name=""/>
-        <p:cNvGrpSpPr/>
-        <p:nvPr/>
-      </p:nvGrpSpPr>
-      <p:grpSpPr>
-        <a:xfrm>
-          <a:off x="0" y="0"/>
-          <a:ext cx="0" cy="0"/>
-          <a:chOff x="0" y="0"/>
-          <a:chExt cx="0" cy="0"/>
-        </a:xfrm>
-      </p:grpSpPr>
-      <p:cxnSp>
-        <p:nvCxnSpPr>
-          <p:cNvPr id="12" name="Straight Connector 11"/>
-          <p:cNvCxnSpPr/>
-          <p:nvPr/>
-        </p:nvCxnSpPr>
-        <p:spPr>
-          <a:xfrm flipH="1" flipV="1">
-            <a:off x="3865417" y="2095500"/>
-            <a:ext cx="4175381" cy="1070220"/>
-          </a:xfrm>
-          <a:prstGeom prst="line">
-            <a:avLst/>
-          </a:prstGeom>
-          <a:ln w="25400">
-            <a:solidFill>
-              <a:schemeClr val="tx1">
-                <a:lumMod val="50000"/>
-                <a:lumOff val="50000"/>
-              </a:schemeClr>
-            </a:solidFill>
-            <a:prstDash val="sysDot"/>
-            <a:headEnd type="none" w="lg" len="lg"/>
-            <a:tailEnd type="none" w="lg" len="lg"/>
-          </a:ln>
-        </p:spPr>
-        <p:style>
-          <a:lnRef idx="1">
-            <a:schemeClr val="accent1"/>
-          </a:lnRef>
-          <a:fillRef idx="0">
-            <a:schemeClr val="accent1"/>
-          </a:fillRef>
-          <a:effectRef idx="0">
-            <a:schemeClr val="accent1"/>
-          </a:effectRef>
-          <a:fontRef idx="minor">
-            <a:schemeClr val="tx1"/>
-          </a:fontRef>
-        </p:style>
-      </p:cxnSp>
-      <p:cxnSp>
-        <p:nvCxnSpPr>
-          <p:cNvPr id="11" name="Straight Connector 10"/>
-          <p:cNvCxnSpPr/>
-          <p:nvPr/>
-        </p:nvCxnSpPr>
-        <p:spPr>
-          <a:xfrm>
-            <a:off x="8207053" y="3165720"/>
-            <a:ext cx="3034144" cy="0"/>
-          </a:xfrm>
-          <a:prstGeom prst="line">
-            <a:avLst/>
-          </a:prstGeom>
-          <a:ln w="25400">
-            <a:solidFill>
-              <a:schemeClr val="tx1">
-                <a:lumMod val="50000"/>
-                <a:lumOff val="50000"/>
-              </a:schemeClr>
-            </a:solidFill>
-            <a:prstDash val="sysDot"/>
-            <a:headEnd type="none" w="lg" len="lg"/>
-            <a:tailEnd type="none" w="lg" len="lg"/>
-          </a:ln>
-        </p:spPr>
-        <p:style>
-          <a:lnRef idx="1">
-            <a:schemeClr val="accent1"/>
-          </a:lnRef>
-          <a:fillRef idx="0">
-            <a:schemeClr val="accent1"/>
-          </a:fillRef>
-          <a:effectRef idx="0">
-            <a:schemeClr val="accent1"/>
-          </a:effectRef>
-          <a:fontRef idx="minor">
-            <a:schemeClr val="tx1"/>
-          </a:fontRef>
-        </p:style>
-      </p:cxnSp>
-      <p:sp>
-        <p:nvSpPr>
-          <p:cNvPr id="6" name="Oval 5"/>
-          <p:cNvSpPr/>
-          <p:nvPr/>
-        </p:nvSpPr>
-        <p:spPr>
-          <a:xfrm>
-            <a:off x="1598791" y="1246826"/>
-            <a:ext cx="6442008" cy="3837792"/>
-          </a:xfrm>
-          <a:prstGeom prst="ellipse">
-            <a:avLst/>
-          </a:prstGeom>
-          <a:noFill/>
-          <a:ln>
-            <a:solidFill>
-              <a:schemeClr val="tx2"/>
-            </a:solidFill>
-          </a:ln>
-        </p:spPr>
-        <p:style>
-          <a:lnRef idx="2">
-            <a:schemeClr val="accent1">
-              <a:shade val="50000"/>
-            </a:schemeClr>
-          </a:lnRef>
-          <a:fillRef idx="1">
-            <a:schemeClr val="accent1"/>
-          </a:fillRef>
-          <a:effectRef idx="0">
-            <a:schemeClr val="accent1"/>
-          </a:effectRef>
-          <a:fontRef idx="minor">
-            <a:schemeClr val="lt1"/>
-          </a:fontRef>
-        </p:style>
-        <p:txBody>
-          <a:bodyPr rtlCol="0" anchor="ctr"/>
-          <a:lstStyle/>
-          <a:p>
-            <a:pPr algn="ctr"/>
-            <a:endParaRPr lang="en-US"/>
-          </a:p>
-        </p:txBody>
-      </p:sp>
-      <p:sp>
-        <p:nvSpPr>
-          <p:cNvPr id="7" name="Oval 6"/>
-          <p:cNvSpPr/>
-          <p:nvPr/>
-        </p:nvSpPr>
-        <p:spPr>
-          <a:xfrm>
-            <a:off x="3699163" y="1929245"/>
-            <a:ext cx="332509" cy="332509"/>
-          </a:xfrm>
-          <a:prstGeom prst="ellipse">
-            <a:avLst/>
-          </a:prstGeom>
-          <a:solidFill>
-            <a:srgbClr val="FF0000"/>
-          </a:solidFill>
-          <a:ln>
-            <a:solidFill>
-              <a:srgbClr val="C00000"/>
-            </a:solidFill>
-          </a:ln>
-        </p:spPr>
-        <p:style>
-          <a:lnRef idx="2">
-            <a:schemeClr val="accent1">
-              <a:shade val="50000"/>
-            </a:schemeClr>
-          </a:lnRef>
-          <a:fillRef idx="1">
-            <a:schemeClr val="accent1"/>
-          </a:fillRef>
-          <a:effectRef idx="0">
-            <a:schemeClr val="accent1"/>
-          </a:effectRef>
-          <a:fontRef idx="minor">
-            <a:schemeClr val="lt1"/>
-          </a:fontRef>
-        </p:style>
-        <p:txBody>
-          <a:bodyPr rtlCol="0" anchor="ctr"/>
-          <a:lstStyle/>
-          <a:p>
-            <a:pPr algn="ctr"/>
-            <a:endParaRPr lang="en-US"/>
-          </a:p>
-        </p:txBody>
-      </p:sp>
-      <p:sp>
-        <p:nvSpPr>
-          <p:cNvPr id="8" name="Oval 7"/>
-          <p:cNvSpPr/>
-          <p:nvPr/>
-        </p:nvSpPr>
-        <p:spPr>
-          <a:xfrm>
-            <a:off x="7874544" y="2999467"/>
-            <a:ext cx="332509" cy="332509"/>
-          </a:xfrm>
-          <a:prstGeom prst="ellipse">
-            <a:avLst/>
-          </a:prstGeom>
-          <a:solidFill>
-            <a:srgbClr val="FF0000"/>
-          </a:solidFill>
-          <a:ln>
-            <a:solidFill>
-              <a:srgbClr val="C00000"/>
-            </a:solidFill>
-          </a:ln>
-        </p:spPr>
-        <p:style>
-          <a:lnRef idx="2">
-            <a:schemeClr val="accent1">
-              <a:shade val="50000"/>
-            </a:schemeClr>
-          </a:lnRef>
-          <a:fillRef idx="1">
-            <a:schemeClr val="accent1"/>
-          </a:fillRef>
-          <a:effectRef idx="0">
-            <a:schemeClr val="accent1"/>
-          </a:effectRef>
-          <a:fontRef idx="minor">
-            <a:schemeClr val="lt1"/>
-          </a:fontRef>
-        </p:style>
-        <p:txBody>
-          <a:bodyPr rtlCol="0" anchor="ctr"/>
-          <a:lstStyle/>
-          <a:p>
-            <a:pPr algn="ctr"/>
-            <a:endParaRPr lang="en-US"/>
-          </a:p>
-        </p:txBody>
-      </p:sp>
-      <p:sp>
-        <p:nvSpPr>
-          <p:cNvPr id="9" name="Oval 8"/>
-          <p:cNvSpPr/>
-          <p:nvPr/>
-        </p:nvSpPr>
-        <p:spPr>
-          <a:xfrm>
-            <a:off x="11180617" y="2999466"/>
-            <a:ext cx="332509" cy="332509"/>
-          </a:xfrm>
-          <a:prstGeom prst="ellipse">
-            <a:avLst/>
-          </a:prstGeom>
-          <a:solidFill>
-            <a:srgbClr val="FF0000"/>
-          </a:solidFill>
-          <a:ln>
-            <a:solidFill>
-              <a:srgbClr val="C00000"/>
-            </a:solidFill>
-          </a:ln>
-        </p:spPr>
-        <p:style>
-          <a:lnRef idx="2">
-            <a:schemeClr val="accent1">
-              <a:shade val="50000"/>
-            </a:schemeClr>
-          </a:lnRef>
-          <a:fillRef idx="1">
-            <a:schemeClr val="accent1"/>
-          </a:fillRef>
-          <a:effectRef idx="0">
-            <a:schemeClr val="accent1"/>
-          </a:effectRef>
-          <a:fontRef idx="minor">
-            <a:schemeClr val="lt1"/>
-          </a:fontRef>
-        </p:style>
-        <p:txBody>
-          <a:bodyPr rtlCol="0" anchor="ctr"/>
-          <a:lstStyle/>
-          <a:p>
-            <a:pPr algn="ctr"/>
-            <a:endParaRPr lang="en-US"/>
-          </a:p>
-        </p:txBody>
-      </p:sp>
-      <p:sp>
-        <p:nvSpPr>
-          <p:cNvPr id="17" name="Rectangle 16"/>
-          <p:cNvSpPr/>
-          <p:nvPr/>
-        </p:nvSpPr>
-        <p:spPr>
-          <a:xfrm>
-            <a:off x="2959192" y="1710778"/>
-            <a:ext cx="529312" cy="769441"/>
-          </a:xfrm>
-          <a:prstGeom prst="rect">
-            <a:avLst/>
-          </a:prstGeom>
-        </p:spPr>
-        <p:txBody>
-          <a:bodyPr wrap="none">
-            <a:spAutoFit/>
-          </a:bodyPr>
-          <a:lstStyle/>
-          <a:p>
-            <a:r>
-              <a:rPr lang="en-US" sz="4400" i="1" dirty="0">
-                <a:latin typeface="Times New Roman" panose="02020603050405020304" pitchFamily="18" charset="0"/>
-              </a:rPr>
-              <a:t>f</a:t>
-            </a:r>
-            <a:r>
-              <a:rPr lang="en-US" sz="4400" i="1" baseline="-25000" dirty="0">
-                <a:latin typeface="Times New Roman" panose="02020603050405020304" pitchFamily="18" charset="0"/>
-              </a:rPr>
-              <a:t>n</a:t>
-            </a:r>
-            <a:endParaRPr lang="en-US" sz="4400" baseline="-25000" dirty="0"/>
-          </a:p>
-        </p:txBody>
-      </p:sp>
-      <p:sp>
-        <p:nvSpPr>
-          <p:cNvPr id="18" name="Rectangle 17"/>
-          <p:cNvSpPr/>
-          <p:nvPr/>
-        </p:nvSpPr>
-        <p:spPr>
-          <a:xfrm>
-            <a:off x="8207052" y="2245889"/>
-            <a:ext cx="570990" cy="769441"/>
-          </a:xfrm>
-          <a:prstGeom prst="rect">
-            <a:avLst/>
-          </a:prstGeom>
-        </p:spPr>
-        <p:txBody>
-          <a:bodyPr wrap="none">
-            <a:spAutoFit/>
-          </a:bodyPr>
-          <a:lstStyle/>
-          <a:p>
-            <a:r>
-              <a:rPr lang="en-US" sz="4400" i="1" dirty="0" err="1" smtClean="0">
-                <a:latin typeface="Times New Roman" panose="02020603050405020304" pitchFamily="18" charset="0"/>
-              </a:rPr>
-              <a:t>f</a:t>
-            </a:r>
-            <a:r>
-              <a:rPr lang="en-US" sz="4400" i="1" baseline="-25000" dirty="0" err="1" smtClean="0">
-                <a:latin typeface="Times New Roman" panose="02020603050405020304" pitchFamily="18" charset="0"/>
-              </a:rPr>
-              <a:t>F</a:t>
-            </a:r>
-            <a:endParaRPr lang="en-US" sz="4400" baseline="-25000" dirty="0"/>
-          </a:p>
-        </p:txBody>
-      </p:sp>
-      <p:sp>
-        <p:nvSpPr>
-          <p:cNvPr id="19" name="Rectangle 18"/>
-          <p:cNvSpPr/>
-          <p:nvPr/>
-        </p:nvSpPr>
-        <p:spPr>
-          <a:xfrm>
-            <a:off x="11082215" y="2154830"/>
-            <a:ext cx="764953" cy="769441"/>
-          </a:xfrm>
-          <a:prstGeom prst="rect">
-            <a:avLst/>
-          </a:prstGeom>
-        </p:spPr>
-        <p:txBody>
-          <a:bodyPr wrap="none">
-            <a:spAutoFit/>
-          </a:bodyPr>
-          <a:lstStyle/>
-          <a:p>
-            <a:r>
-              <a:rPr lang="en-US" sz="4400" i="1" dirty="0" smtClean="0">
-                <a:latin typeface="Times New Roman" panose="02020603050405020304" pitchFamily="18" charset="0"/>
-              </a:rPr>
-              <a:t>f *</a:t>
-            </a:r>
-            <a:endParaRPr lang="en-US" sz="4400" baseline="-25000" dirty="0"/>
-          </a:p>
-        </p:txBody>
-      </p:sp>
-      <p:sp>
-        <p:nvSpPr>
-          <p:cNvPr id="20" name="TextBox 19"/>
-          <p:cNvSpPr txBox="1"/>
-          <p:nvPr/>
-        </p:nvSpPr>
-        <p:spPr>
-          <a:xfrm>
-            <a:off x="2978726" y="1440809"/>
-            <a:ext cx="1607128" cy="707886"/>
-          </a:xfrm>
-          <a:prstGeom prst="rect">
-            <a:avLst/>
-          </a:prstGeom>
-          <a:noFill/>
-        </p:spPr>
-        <p:txBody>
-          <a:bodyPr wrap="square" rtlCol="0">
-            <a:spAutoFit/>
-          </a:bodyPr>
-          <a:lstStyle/>
-          <a:p>
-            <a:r>
-              <a:rPr lang="en-US" sz="4000" dirty="0" smtClean="0"/>
-              <a:t>~</a:t>
-            </a:r>
-            <a:endParaRPr lang="en-US" sz="4000" dirty="0"/>
-          </a:p>
-        </p:txBody>
-      </p:sp>
-      <p:pic>
-        <p:nvPicPr>
-          <p:cNvPr id="30" name="Picture 29"/>
-          <p:cNvPicPr>
-            <a:picLocks noChangeAspect="1"/>
-          </p:cNvPicPr>
-          <p:nvPr/>
-        </p:nvPicPr>
-        <p:blipFill>
-          <a:blip r:embed="rId2"/>
-          <a:stretch>
-            <a:fillRect/>
-          </a:stretch>
-        </p:blipFill>
-        <p:spPr>
-          <a:xfrm>
-            <a:off x="5199175" y="5167877"/>
-            <a:ext cx="895238" cy="876190"/>
-          </a:xfrm>
-          <a:prstGeom prst="rect">
-            <a:avLst/>
-          </a:prstGeom>
-        </p:spPr>
-      </p:pic>
-    </p:spTree>
-    <p:extLst>
-      <p:ext uri="{BB962C8B-B14F-4D97-AF65-F5344CB8AC3E}">
-        <p14:creationId xmlns:p14="http://schemas.microsoft.com/office/powerpoint/2010/main" val="2989063987"/>
-      </p:ext>
-    </p:extLst>
-  </p:cSld>
-  <p:clrMapOvr>
-    <a:masterClrMapping/>
-  </p:clrMapOvr>
-  <p:timing>
-    <p:tnLst>
-      <p:par>
-        <p:cTn id="1" dur="indefinite" restart="never" nodeType="tmRoot"/>
-      </p:par>
-    </p:tnLst>
-  </p:timing>
-</p:sld>
-</file>
-
-<file path=ppt/slides/slide2.xml><?xml version="1.0" encoding="utf-8"?>
-<p:sld xmlns:a="http://schemas.openxmlformats.org/drawingml/2006/main" xmlns:r="http://schemas.openxmlformats.org/officeDocument/2006/relationships" xmlns:p="http://schemas.openxmlformats.org/presentationml/2006/main">
-  <p:cSld>
     <p:bg>
       <p:bgPr>
         <a:solidFill>
@@ -16345,6 +15835,277 @@
     <p:extLst>
       <p:ext uri="{BB962C8B-B14F-4D97-AF65-F5344CB8AC3E}">
         <p14:creationId xmlns:p14="http://schemas.microsoft.com/office/powerpoint/2010/main" val="2311579716"/>
+      </p:ext>
+    </p:extLst>
+  </p:cSld>
+  <p:clrMapOvr>
+    <a:masterClrMapping/>
+  </p:clrMapOvr>
+  <p:timing>
+    <p:tnLst>
+      <p:par>
+        <p:cTn id="1" dur="indefinite" restart="never" nodeType="tmRoot"/>
+      </p:par>
+    </p:tnLst>
+  </p:timing>
+</p:sld>
+</file>
+
+<file path=ppt/slides/slide2.xml><?xml version="1.0" encoding="utf-8"?>
+<p:sld xmlns:a="http://schemas.openxmlformats.org/drawingml/2006/main" xmlns:r="http://schemas.openxmlformats.org/officeDocument/2006/relationships" xmlns:p="http://schemas.openxmlformats.org/presentationml/2006/main">
+  <p:cSld>
+    <p:spTree>
+      <p:nvGrpSpPr>
+        <p:cNvPr id="1" name=""/>
+        <p:cNvGrpSpPr/>
+        <p:nvPr/>
+      </p:nvGrpSpPr>
+      <p:grpSpPr>
+        <a:xfrm>
+          <a:off x="0" y="0"/>
+          <a:ext cx="0" cy="0"/>
+          <a:chOff x="0" y="0"/>
+          <a:chExt cx="0" cy="0"/>
+        </a:xfrm>
+      </p:grpSpPr>
+      <p:sp>
+        <p:nvSpPr>
+          <p:cNvPr id="6" name="Oval 5"/>
+          <p:cNvSpPr/>
+          <p:nvPr/>
+        </p:nvSpPr>
+        <p:spPr>
+          <a:xfrm>
+            <a:off x="726554" y="900523"/>
+            <a:ext cx="6646551" cy="2367035"/>
+          </a:xfrm>
+          <a:prstGeom prst="ellipse">
+            <a:avLst/>
+          </a:prstGeom>
+          <a:noFill/>
+          <a:ln>
+            <a:solidFill>
+              <a:schemeClr val="tx2"/>
+            </a:solidFill>
+          </a:ln>
+        </p:spPr>
+        <p:style>
+          <a:lnRef idx="2">
+            <a:schemeClr val="accent1">
+              <a:shade val="50000"/>
+            </a:schemeClr>
+          </a:lnRef>
+          <a:fillRef idx="1">
+            <a:schemeClr val="accent1"/>
+          </a:fillRef>
+          <a:effectRef idx="0">
+            <a:schemeClr val="accent1"/>
+          </a:effectRef>
+          <a:fontRef idx="minor">
+            <a:schemeClr val="lt1"/>
+          </a:fontRef>
+        </p:style>
+        <p:txBody>
+          <a:bodyPr rtlCol="0" anchor="ctr"/>
+          <a:lstStyle/>
+          <a:p>
+            <a:pPr algn="ctr"/>
+            <a:endParaRPr lang="en-US"/>
+          </a:p>
+        </p:txBody>
+      </p:sp>
+      <p:pic>
+        <p:nvPicPr>
+          <p:cNvPr id="16" name="Picture 15"/>
+          <p:cNvPicPr>
+            <a:picLocks noChangeAspect="1"/>
+          </p:cNvPicPr>
+          <p:nvPr/>
+        </p:nvPicPr>
+        <p:blipFill>
+          <a:blip r:embed="rId2"/>
+          <a:stretch>
+            <a:fillRect/>
+          </a:stretch>
+        </p:blipFill>
+        <p:spPr>
+          <a:xfrm>
+            <a:off x="5489051" y="7382719"/>
+            <a:ext cx="378114" cy="756227"/>
+          </a:xfrm>
+          <a:prstGeom prst="rect">
+            <a:avLst/>
+          </a:prstGeom>
+        </p:spPr>
+      </p:pic>
+      <p:sp>
+        <p:nvSpPr>
+          <p:cNvPr id="32" name="Rectangle 31"/>
+          <p:cNvSpPr/>
+          <p:nvPr/>
+        </p:nvSpPr>
+        <p:spPr>
+          <a:xfrm>
+            <a:off x="234270" y="520995"/>
+            <a:ext cx="11563499" cy="3246057"/>
+          </a:xfrm>
+          <a:prstGeom prst="rect">
+            <a:avLst/>
+          </a:prstGeom>
+          <a:noFill/>
+          <a:ln>
+            <a:solidFill>
+              <a:srgbClr val="00B050"/>
+            </a:solidFill>
+          </a:ln>
+        </p:spPr>
+        <p:style>
+          <a:lnRef idx="2">
+            <a:schemeClr val="accent1">
+              <a:shade val="50000"/>
+            </a:schemeClr>
+          </a:lnRef>
+          <a:fillRef idx="1">
+            <a:schemeClr val="accent1"/>
+          </a:fillRef>
+          <a:effectRef idx="0">
+            <a:schemeClr val="accent1"/>
+          </a:effectRef>
+          <a:fontRef idx="minor">
+            <a:schemeClr val="lt1"/>
+          </a:fontRef>
+        </p:style>
+        <p:txBody>
+          <a:bodyPr rtlCol="0" anchor="ctr"/>
+          <a:lstStyle/>
+          <a:p>
+            <a:pPr algn="ctr"/>
+            <a:endParaRPr lang="en-US"/>
+          </a:p>
+        </p:txBody>
+      </p:sp>
+      <p:pic>
+        <p:nvPicPr>
+          <p:cNvPr id="34" name="Picture 33"/>
+          <p:cNvPicPr>
+            <a:picLocks noChangeAspect="1"/>
+          </p:cNvPicPr>
+          <p:nvPr/>
+        </p:nvPicPr>
+        <p:blipFill>
+          <a:blip r:embed="rId3"/>
+          <a:stretch>
+            <a:fillRect/>
+          </a:stretch>
+        </p:blipFill>
+        <p:spPr>
+          <a:xfrm>
+            <a:off x="8445016" y="3243380"/>
+            <a:ext cx="3203196" cy="370527"/>
+          </a:xfrm>
+          <a:prstGeom prst="rect">
+            <a:avLst/>
+          </a:prstGeom>
+        </p:spPr>
+      </p:pic>
+      <p:sp>
+        <p:nvSpPr>
+          <p:cNvPr id="18" name="Oval 17"/>
+          <p:cNvSpPr/>
+          <p:nvPr/>
+        </p:nvSpPr>
+        <p:spPr>
+          <a:xfrm>
+            <a:off x="393404" y="637953"/>
+            <a:ext cx="9239693" cy="2966003"/>
+          </a:xfrm>
+          <a:prstGeom prst="ellipse">
+            <a:avLst/>
+          </a:prstGeom>
+          <a:noFill/>
+          <a:ln>
+            <a:solidFill>
+              <a:schemeClr val="tx2"/>
+            </a:solidFill>
+          </a:ln>
+        </p:spPr>
+        <p:style>
+          <a:lnRef idx="2">
+            <a:schemeClr val="accent1">
+              <a:shade val="50000"/>
+            </a:schemeClr>
+          </a:lnRef>
+          <a:fillRef idx="1">
+            <a:schemeClr val="accent1"/>
+          </a:fillRef>
+          <a:effectRef idx="0">
+            <a:schemeClr val="accent1"/>
+          </a:effectRef>
+          <a:fontRef idx="minor">
+            <a:schemeClr val="lt1"/>
+          </a:fontRef>
+        </p:style>
+        <p:txBody>
+          <a:bodyPr rtlCol="0" anchor="ctr"/>
+          <a:lstStyle/>
+          <a:p>
+            <a:pPr algn="ctr"/>
+            <a:endParaRPr lang="en-US"/>
+          </a:p>
+        </p:txBody>
+      </p:sp>
+      <p:pic>
+        <p:nvPicPr>
+          <p:cNvPr id="15" name="Picture 14"/>
+          <p:cNvPicPr>
+            <a:picLocks noChangeAspect="1"/>
+          </p:cNvPicPr>
+          <p:nvPr/>
+        </p:nvPicPr>
+        <p:blipFill>
+          <a:blip r:embed="rId4"/>
+          <a:stretch>
+            <a:fillRect/>
+          </a:stretch>
+        </p:blipFill>
+        <p:spPr>
+          <a:xfrm>
+            <a:off x="7927897" y="827558"/>
+            <a:ext cx="637148" cy="676815"/>
+          </a:xfrm>
+          <a:prstGeom prst="rect">
+            <a:avLst/>
+          </a:prstGeom>
+        </p:spPr>
+      </p:pic>
+      <p:pic>
+        <p:nvPicPr>
+          <p:cNvPr id="2" name="Picture 1"/>
+          <p:cNvPicPr>
+            <a:picLocks noChangeAspect="1"/>
+          </p:cNvPicPr>
+          <p:nvPr/>
+        </p:nvPicPr>
+        <p:blipFill>
+          <a:blip r:embed="rId5"/>
+          <a:stretch>
+            <a:fillRect/>
+          </a:stretch>
+        </p:blipFill>
+        <p:spPr>
+          <a:xfrm>
+            <a:off x="3518073" y="2725722"/>
+            <a:ext cx="821570" cy="762148"/>
+          </a:xfrm>
+          <a:prstGeom prst="rect">
+            <a:avLst/>
+          </a:prstGeom>
+        </p:spPr>
+      </p:pic>
+    </p:spTree>
+    <p:extLst>
+      <p:ext uri="{BB962C8B-B14F-4D97-AF65-F5344CB8AC3E}">
+        <p14:creationId xmlns:p14="http://schemas.microsoft.com/office/powerpoint/2010/main" val="1843355927"/>
       </p:ext>
     </p:extLst>
   </p:cSld>
@@ -16389,8 +16150,8 @@
         </p:nvCxnSpPr>
         <p:spPr>
           <a:xfrm flipH="1" flipV="1">
-            <a:off x="6851692" y="1173535"/>
-            <a:ext cx="969766" cy="816378"/>
+            <a:off x="6110146" y="1249326"/>
+            <a:ext cx="1187470" cy="740588"/>
           </a:xfrm>
           <a:prstGeom prst="line">
             <a:avLst/>
@@ -16426,14 +16187,15 @@
         <p:nvCxnSpPr>
           <p:cNvPr id="11" name="Straight Connector 10"/>
           <p:cNvCxnSpPr>
+            <a:stCxn id="41" idx="6"/>
             <a:endCxn id="42" idx="2"/>
           </p:cNvCxnSpPr>
           <p:nvPr/>
         </p:nvCxnSpPr>
         <p:spPr>
           <a:xfrm>
-            <a:off x="7984915" y="2084042"/>
-            <a:ext cx="2790956" cy="0"/>
+            <a:off x="7524860" y="2084042"/>
+            <a:ext cx="3251011" cy="0"/>
           </a:xfrm>
           <a:prstGeom prst="line">
             <a:avLst/>
@@ -16473,8 +16235,8 @@
         </p:nvSpPr>
         <p:spPr>
           <a:xfrm>
-            <a:off x="737578" y="684791"/>
-            <a:ext cx="7204130" cy="2766765"/>
+            <a:off x="726554" y="900523"/>
+            <a:ext cx="6646551" cy="2367035"/>
           </a:xfrm>
           <a:prstGeom prst="ellipse">
             <a:avLst/>
@@ -16521,7 +16283,7 @@
         </p:nvSpPr>
         <p:spPr>
           <a:xfrm>
-            <a:off x="6624448" y="946291"/>
+            <a:off x="5882902" y="1022082"/>
             <a:ext cx="266233" cy="266233"/>
           </a:xfrm>
           <a:prstGeom prst="ellipse">
@@ -16563,7 +16325,7 @@
       </p:sp>
       <p:pic>
         <p:nvPicPr>
-          <p:cNvPr id="14" name="Picture 13"/>
+          <p:cNvPr id="16" name="Picture 15"/>
           <p:cNvPicPr>
             <a:picLocks noChangeAspect="1"/>
           </p:cNvPicPr>
@@ -16577,8 +16339,8 @@
         </p:blipFill>
         <p:spPr>
           <a:xfrm>
-            <a:off x="6564577" y="1298631"/>
-            <a:ext cx="385973" cy="806340"/>
+            <a:off x="5489051" y="7382719"/>
+            <a:ext cx="378114" cy="756227"/>
           </a:xfrm>
           <a:prstGeom prst="rect">
             <a:avLst/>
@@ -16587,7 +16349,7 @@
       </p:pic>
       <p:pic>
         <p:nvPicPr>
-          <p:cNvPr id="15" name="Picture 14"/>
+          <p:cNvPr id="17" name="Picture 16"/>
           <p:cNvPicPr>
             <a:picLocks noChangeAspect="1"/>
           </p:cNvPicPr>
@@ -16601,80 +16363,8 @@
         </p:blipFill>
         <p:spPr>
           <a:xfrm>
-            <a:off x="4021069" y="3043681"/>
-            <a:ext cx="637148" cy="676815"/>
-          </a:xfrm>
-          <a:prstGeom prst="rect">
-            <a:avLst/>
-          </a:prstGeom>
-        </p:spPr>
-      </p:pic>
-      <p:pic>
-        <p:nvPicPr>
-          <p:cNvPr id="16" name="Picture 15"/>
-          <p:cNvPicPr>
-            <a:picLocks noChangeAspect="1"/>
-          </p:cNvPicPr>
-          <p:nvPr/>
-        </p:nvPicPr>
-        <p:blipFill>
-          <a:blip r:embed="rId4"/>
-          <a:stretch>
-            <a:fillRect/>
-          </a:stretch>
-        </p:blipFill>
-        <p:spPr>
-          <a:xfrm>
-            <a:off x="5489051" y="7382719"/>
-            <a:ext cx="378114" cy="756227"/>
-          </a:xfrm>
-          <a:prstGeom prst="rect">
-            <a:avLst/>
-          </a:prstGeom>
-        </p:spPr>
-      </p:pic>
-      <p:pic>
-        <p:nvPicPr>
-          <p:cNvPr id="17" name="Picture 16"/>
-          <p:cNvPicPr>
-            <a:picLocks noChangeAspect="1"/>
-          </p:cNvPicPr>
-          <p:nvPr/>
-        </p:nvPicPr>
-        <p:blipFill>
-          <a:blip r:embed="rId5"/>
-          <a:stretch>
-            <a:fillRect/>
-          </a:stretch>
-        </p:blipFill>
-        <p:spPr>
-          <a:xfrm>
             <a:off x="10775871" y="2217158"/>
             <a:ext cx="485284" cy="508564"/>
-          </a:xfrm>
-          <a:prstGeom prst="rect">
-            <a:avLst/>
-          </a:prstGeom>
-        </p:spPr>
-      </p:pic>
-      <p:pic>
-        <p:nvPicPr>
-          <p:cNvPr id="28" name="Picture 27"/>
-          <p:cNvPicPr>
-            <a:picLocks noChangeAspect="1"/>
-          </p:cNvPicPr>
-          <p:nvPr/>
-        </p:nvPicPr>
-        <p:blipFill>
-          <a:blip r:embed="rId6"/>
-          <a:stretch>
-            <a:fillRect/>
-          </a:stretch>
-        </p:blipFill>
-        <p:spPr>
-          <a:xfrm>
-            <a:off x="7894664" y="2335806"/>
-            <a:ext cx="480222" cy="585549"/>
           </a:xfrm>
           <a:prstGeom prst="rect">
             <a:avLst/>
@@ -16736,7 +16426,7 @@
           <p:nvPr/>
         </p:nvPicPr>
         <p:blipFill>
-          <a:blip r:embed="rId7"/>
+          <a:blip r:embed="rId4"/>
           <a:stretch>
             <a:fillRect/>
           </a:stretch>
@@ -16761,7 +16451,7 @@
         </p:nvSpPr>
         <p:spPr>
           <a:xfrm>
-            <a:off x="7782469" y="1950924"/>
+            <a:off x="7258627" y="1950925"/>
             <a:ext cx="266233" cy="266233"/>
           </a:xfrm>
           <a:prstGeom prst="ellipse">
@@ -16851,10 +16541,152 @@
           </a:p>
         </p:txBody>
       </p:sp>
+      <p:sp>
+        <p:nvSpPr>
+          <p:cNvPr id="18" name="Oval 17"/>
+          <p:cNvSpPr/>
+          <p:nvPr/>
+        </p:nvSpPr>
+        <p:spPr>
+          <a:xfrm>
+            <a:off x="393404" y="637953"/>
+            <a:ext cx="9239693" cy="2966003"/>
+          </a:xfrm>
+          <a:prstGeom prst="ellipse">
+            <a:avLst/>
+          </a:prstGeom>
+          <a:noFill/>
+          <a:ln>
+            <a:solidFill>
+              <a:schemeClr val="tx2"/>
+            </a:solidFill>
+          </a:ln>
+        </p:spPr>
+        <p:style>
+          <a:lnRef idx="2">
+            <a:schemeClr val="accent1">
+              <a:shade val="50000"/>
+            </a:schemeClr>
+          </a:lnRef>
+          <a:fillRef idx="1">
+            <a:schemeClr val="accent1"/>
+          </a:fillRef>
+          <a:effectRef idx="0">
+            <a:schemeClr val="accent1"/>
+          </a:effectRef>
+          <a:fontRef idx="minor">
+            <a:schemeClr val="lt1"/>
+          </a:fontRef>
+        </p:style>
+        <p:txBody>
+          <a:bodyPr rtlCol="0" anchor="ctr"/>
+          <a:lstStyle/>
+          <a:p>
+            <a:pPr algn="ctr"/>
+            <a:endParaRPr lang="en-US"/>
+          </a:p>
+        </p:txBody>
+      </p:sp>
+      <p:pic>
+        <p:nvPicPr>
+          <p:cNvPr id="15" name="Picture 14"/>
+          <p:cNvPicPr>
+            <a:picLocks noChangeAspect="1"/>
+          </p:cNvPicPr>
+          <p:nvPr/>
+        </p:nvPicPr>
+        <p:blipFill>
+          <a:blip r:embed="rId5"/>
+          <a:stretch>
+            <a:fillRect/>
+          </a:stretch>
+        </p:blipFill>
+        <p:spPr>
+          <a:xfrm>
+            <a:off x="7927897" y="827558"/>
+            <a:ext cx="637148" cy="676815"/>
+          </a:xfrm>
+          <a:prstGeom prst="rect">
+            <a:avLst/>
+          </a:prstGeom>
+        </p:spPr>
+      </p:pic>
+      <p:pic>
+        <p:nvPicPr>
+          <p:cNvPr id="2" name="Picture 1"/>
+          <p:cNvPicPr>
+            <a:picLocks noChangeAspect="1"/>
+          </p:cNvPicPr>
+          <p:nvPr/>
+        </p:nvPicPr>
+        <p:blipFill>
+          <a:blip r:embed="rId6"/>
+          <a:stretch>
+            <a:fillRect/>
+          </a:stretch>
+        </p:blipFill>
+        <p:spPr>
+          <a:xfrm>
+            <a:off x="3518073" y="2725722"/>
+            <a:ext cx="821570" cy="762148"/>
+          </a:xfrm>
+          <a:prstGeom prst="rect">
+            <a:avLst/>
+          </a:prstGeom>
+        </p:spPr>
+      </p:pic>
+      <p:pic>
+        <p:nvPicPr>
+          <p:cNvPr id="3" name="Picture 2"/>
+          <p:cNvPicPr>
+            <a:picLocks noChangeAspect="1"/>
+          </p:cNvPicPr>
+          <p:nvPr/>
+        </p:nvPicPr>
+        <p:blipFill>
+          <a:blip r:embed="rId7"/>
+          <a:stretch>
+            <a:fillRect/>
+          </a:stretch>
+        </p:blipFill>
+        <p:spPr>
+          <a:xfrm>
+            <a:off x="5864015" y="1349982"/>
+            <a:ext cx="328904" cy="672108"/>
+          </a:xfrm>
+          <a:prstGeom prst="rect">
+            <a:avLst/>
+          </a:prstGeom>
+        </p:spPr>
+      </p:pic>
+      <p:pic>
+        <p:nvPicPr>
+          <p:cNvPr id="4" name="Picture 3"/>
+          <p:cNvPicPr>
+            <a:picLocks noChangeAspect="1"/>
+          </p:cNvPicPr>
+          <p:nvPr/>
+        </p:nvPicPr>
+        <p:blipFill>
+          <a:blip r:embed="rId8"/>
+          <a:stretch>
+            <a:fillRect/>
+          </a:stretch>
+        </p:blipFill>
+        <p:spPr>
+          <a:xfrm>
+            <a:off x="7454784" y="2403156"/>
+            <a:ext cx="345669" cy="575482"/>
+          </a:xfrm>
+          <a:prstGeom prst="rect">
+            <a:avLst/>
+          </a:prstGeom>
+        </p:spPr>
+      </p:pic>
     </p:spTree>
     <p:extLst>
       <p:ext uri="{BB962C8B-B14F-4D97-AF65-F5344CB8AC3E}">
-        <p14:creationId xmlns:p14="http://schemas.microsoft.com/office/powerpoint/2010/main" val="737194411"/>
+        <p14:creationId xmlns:p14="http://schemas.microsoft.com/office/powerpoint/2010/main" val="1908504036"/>
       </p:ext>
     </p:extLst>
   </p:cSld>
@@ -16888,1368 +16720,6 @@
           <a:chExt cx="0" cy="0"/>
         </a:xfrm>
       </p:grpSpPr>
-      <p:cxnSp>
-        <p:nvCxnSpPr>
-          <p:cNvPr id="12" name="Straight Connector 11"/>
-          <p:cNvCxnSpPr>
-            <a:stCxn id="41" idx="1"/>
-            <a:endCxn id="7" idx="5"/>
-          </p:cNvCxnSpPr>
-          <p:nvPr/>
-        </p:nvCxnSpPr>
-        <p:spPr>
-          <a:xfrm flipH="1" flipV="1">
-            <a:off x="6851692" y="1173535"/>
-            <a:ext cx="969766" cy="816378"/>
-          </a:xfrm>
-          <a:prstGeom prst="line">
-            <a:avLst/>
-          </a:prstGeom>
-          <a:ln w="25400">
-            <a:solidFill>
-              <a:schemeClr val="tx1">
-                <a:lumMod val="50000"/>
-                <a:lumOff val="50000"/>
-              </a:schemeClr>
-            </a:solidFill>
-            <a:prstDash val="sysDot"/>
-            <a:headEnd type="none" w="lg" len="lg"/>
-            <a:tailEnd type="none" w="lg" len="lg"/>
-          </a:ln>
-        </p:spPr>
-        <p:style>
-          <a:lnRef idx="1">
-            <a:schemeClr val="accent1"/>
-          </a:lnRef>
-          <a:fillRef idx="0">
-            <a:schemeClr val="accent1"/>
-          </a:fillRef>
-          <a:effectRef idx="0">
-            <a:schemeClr val="accent1"/>
-          </a:effectRef>
-          <a:fontRef idx="minor">
-            <a:schemeClr val="tx1"/>
-          </a:fontRef>
-        </p:style>
-      </p:cxnSp>
-      <p:cxnSp>
-        <p:nvCxnSpPr>
-          <p:cNvPr id="11" name="Straight Connector 10"/>
-          <p:cNvCxnSpPr>
-            <a:endCxn id="42" idx="2"/>
-          </p:cNvCxnSpPr>
-          <p:nvPr/>
-        </p:nvCxnSpPr>
-        <p:spPr>
-          <a:xfrm>
-            <a:off x="7984915" y="2084042"/>
-            <a:ext cx="2790956" cy="0"/>
-          </a:xfrm>
-          <a:prstGeom prst="line">
-            <a:avLst/>
-          </a:prstGeom>
-          <a:ln w="25400">
-            <a:solidFill>
-              <a:schemeClr val="tx1">
-                <a:lumMod val="50000"/>
-                <a:lumOff val="50000"/>
-              </a:schemeClr>
-            </a:solidFill>
-            <a:prstDash val="sysDot"/>
-            <a:headEnd type="none" w="lg" len="lg"/>
-            <a:tailEnd type="none" w="lg" len="lg"/>
-          </a:ln>
-        </p:spPr>
-        <p:style>
-          <a:lnRef idx="1">
-            <a:schemeClr val="accent1"/>
-          </a:lnRef>
-          <a:fillRef idx="0">
-            <a:schemeClr val="accent1"/>
-          </a:fillRef>
-          <a:effectRef idx="0">
-            <a:schemeClr val="accent1"/>
-          </a:effectRef>
-          <a:fontRef idx="minor">
-            <a:schemeClr val="tx1"/>
-          </a:fontRef>
-        </p:style>
-      </p:cxnSp>
-      <p:sp>
-        <p:nvSpPr>
-          <p:cNvPr id="6" name="Oval 5"/>
-          <p:cNvSpPr/>
-          <p:nvPr/>
-        </p:nvSpPr>
-        <p:spPr>
-          <a:xfrm>
-            <a:off x="737578" y="684791"/>
-            <a:ext cx="7204130" cy="2766765"/>
-          </a:xfrm>
-          <a:prstGeom prst="ellipse">
-            <a:avLst/>
-          </a:prstGeom>
-          <a:noFill/>
-          <a:ln>
-            <a:solidFill>
-              <a:schemeClr val="tx2"/>
-            </a:solidFill>
-          </a:ln>
-        </p:spPr>
-        <p:style>
-          <a:lnRef idx="2">
-            <a:schemeClr val="accent1">
-              <a:shade val="50000"/>
-            </a:schemeClr>
-          </a:lnRef>
-          <a:fillRef idx="1">
-            <a:schemeClr val="accent1"/>
-          </a:fillRef>
-          <a:effectRef idx="0">
-            <a:schemeClr val="accent1"/>
-          </a:effectRef>
-          <a:fontRef idx="minor">
-            <a:schemeClr val="lt1"/>
-          </a:fontRef>
-        </p:style>
-        <p:txBody>
-          <a:bodyPr rtlCol="0" anchor="ctr"/>
-          <a:lstStyle/>
-          <a:p>
-            <a:pPr algn="ctr"/>
-            <a:endParaRPr lang="en-US"/>
-          </a:p>
-        </p:txBody>
-      </p:sp>
-      <p:sp>
-        <p:nvSpPr>
-          <p:cNvPr id="7" name="Oval 6"/>
-          <p:cNvSpPr>
-            <a:spLocks noChangeAspect="1"/>
-          </p:cNvSpPr>
-          <p:nvPr/>
-        </p:nvSpPr>
-        <p:spPr>
-          <a:xfrm>
-            <a:off x="6624448" y="946291"/>
-            <a:ext cx="266233" cy="266233"/>
-          </a:xfrm>
-          <a:prstGeom prst="ellipse">
-            <a:avLst/>
-          </a:prstGeom>
-          <a:solidFill>
-            <a:schemeClr val="accent1"/>
-          </a:solidFill>
-          <a:ln>
-            <a:solidFill>
-              <a:schemeClr val="accent1"/>
-            </a:solidFill>
-          </a:ln>
-        </p:spPr>
-        <p:style>
-          <a:lnRef idx="2">
-            <a:schemeClr val="accent1">
-              <a:shade val="50000"/>
-            </a:schemeClr>
-          </a:lnRef>
-          <a:fillRef idx="1">
-            <a:schemeClr val="accent1"/>
-          </a:fillRef>
-          <a:effectRef idx="0">
-            <a:schemeClr val="accent1"/>
-          </a:effectRef>
-          <a:fontRef idx="minor">
-            <a:schemeClr val="lt1"/>
-          </a:fontRef>
-        </p:style>
-        <p:txBody>
-          <a:bodyPr rtlCol="0" anchor="ctr"/>
-          <a:lstStyle/>
-          <a:p>
-            <a:pPr algn="ctr"/>
-            <a:endParaRPr lang="en-US"/>
-          </a:p>
-        </p:txBody>
-      </p:sp>
-      <p:pic>
-        <p:nvPicPr>
-          <p:cNvPr id="14" name="Picture 13"/>
-          <p:cNvPicPr>
-            <a:picLocks noChangeAspect="1"/>
-          </p:cNvPicPr>
-          <p:nvPr/>
-        </p:nvPicPr>
-        <p:blipFill>
-          <a:blip r:embed="rId2"/>
-          <a:stretch>
-            <a:fillRect/>
-          </a:stretch>
-        </p:blipFill>
-        <p:spPr>
-          <a:xfrm>
-            <a:off x="6564577" y="1298631"/>
-            <a:ext cx="385973" cy="806340"/>
-          </a:xfrm>
-          <a:prstGeom prst="rect">
-            <a:avLst/>
-          </a:prstGeom>
-        </p:spPr>
-      </p:pic>
-      <p:pic>
-        <p:nvPicPr>
-          <p:cNvPr id="15" name="Picture 14"/>
-          <p:cNvPicPr>
-            <a:picLocks noChangeAspect="1"/>
-          </p:cNvPicPr>
-          <p:nvPr/>
-        </p:nvPicPr>
-        <p:blipFill>
-          <a:blip r:embed="rId3"/>
-          <a:stretch>
-            <a:fillRect/>
-          </a:stretch>
-        </p:blipFill>
-        <p:spPr>
-          <a:xfrm>
-            <a:off x="4021069" y="3043681"/>
-            <a:ext cx="637148" cy="676815"/>
-          </a:xfrm>
-          <a:prstGeom prst="rect">
-            <a:avLst/>
-          </a:prstGeom>
-        </p:spPr>
-      </p:pic>
-      <p:pic>
-        <p:nvPicPr>
-          <p:cNvPr id="16" name="Picture 15"/>
-          <p:cNvPicPr>
-            <a:picLocks noChangeAspect="1"/>
-          </p:cNvPicPr>
-          <p:nvPr/>
-        </p:nvPicPr>
-        <p:blipFill>
-          <a:blip r:embed="rId4"/>
-          <a:stretch>
-            <a:fillRect/>
-          </a:stretch>
-        </p:blipFill>
-        <p:spPr>
-          <a:xfrm>
-            <a:off x="5489051" y="7382719"/>
-            <a:ext cx="378114" cy="756227"/>
-          </a:xfrm>
-          <a:prstGeom prst="rect">
-            <a:avLst/>
-          </a:prstGeom>
-        </p:spPr>
-      </p:pic>
-      <p:pic>
-        <p:nvPicPr>
-          <p:cNvPr id="17" name="Picture 16"/>
-          <p:cNvPicPr>
-            <a:picLocks noChangeAspect="1"/>
-          </p:cNvPicPr>
-          <p:nvPr/>
-        </p:nvPicPr>
-        <p:blipFill>
-          <a:blip r:embed="rId5"/>
-          <a:stretch>
-            <a:fillRect/>
-          </a:stretch>
-        </p:blipFill>
-        <p:spPr>
-          <a:xfrm>
-            <a:off x="10775871" y="2217158"/>
-            <a:ext cx="485284" cy="508564"/>
-          </a:xfrm>
-          <a:prstGeom prst="rect">
-            <a:avLst/>
-          </a:prstGeom>
-        </p:spPr>
-      </p:pic>
-      <p:pic>
-        <p:nvPicPr>
-          <p:cNvPr id="28" name="Picture 27"/>
-          <p:cNvPicPr>
-            <a:picLocks noChangeAspect="1"/>
-          </p:cNvPicPr>
-          <p:nvPr/>
-        </p:nvPicPr>
-        <p:blipFill>
-          <a:blip r:embed="rId6"/>
-          <a:stretch>
-            <a:fillRect/>
-          </a:stretch>
-        </p:blipFill>
-        <p:spPr>
-          <a:xfrm>
-            <a:off x="7894664" y="2335806"/>
-            <a:ext cx="480222" cy="585549"/>
-          </a:xfrm>
-          <a:prstGeom prst="rect">
-            <a:avLst/>
-          </a:prstGeom>
-        </p:spPr>
-      </p:pic>
-      <p:sp>
-        <p:nvSpPr>
-          <p:cNvPr id="32" name="Rectangle 31"/>
-          <p:cNvSpPr/>
-          <p:nvPr/>
-        </p:nvSpPr>
-        <p:spPr>
-          <a:xfrm>
-            <a:off x="234270" y="520995"/>
-            <a:ext cx="11563499" cy="3246057"/>
-          </a:xfrm>
-          <a:prstGeom prst="rect">
-            <a:avLst/>
-          </a:prstGeom>
-          <a:noFill/>
-          <a:ln>
-            <a:solidFill>
-              <a:srgbClr val="00B050"/>
-            </a:solidFill>
-          </a:ln>
-        </p:spPr>
-        <p:style>
-          <a:lnRef idx="2">
-            <a:schemeClr val="accent1">
-              <a:shade val="50000"/>
-            </a:schemeClr>
-          </a:lnRef>
-          <a:fillRef idx="1">
-            <a:schemeClr val="accent1"/>
-          </a:fillRef>
-          <a:effectRef idx="0">
-            <a:schemeClr val="accent1"/>
-          </a:effectRef>
-          <a:fontRef idx="minor">
-            <a:schemeClr val="lt1"/>
-          </a:fontRef>
-        </p:style>
-        <p:txBody>
-          <a:bodyPr rtlCol="0" anchor="ctr"/>
-          <a:lstStyle/>
-          <a:p>
-            <a:pPr algn="ctr"/>
-            <a:endParaRPr lang="en-US"/>
-          </a:p>
-        </p:txBody>
-      </p:sp>
-      <p:pic>
-        <p:nvPicPr>
-          <p:cNvPr id="34" name="Picture 33"/>
-          <p:cNvPicPr>
-            <a:picLocks noChangeAspect="1"/>
-          </p:cNvPicPr>
-          <p:nvPr/>
-        </p:nvPicPr>
-        <p:blipFill>
-          <a:blip r:embed="rId7"/>
-          <a:stretch>
-            <a:fillRect/>
-          </a:stretch>
-        </p:blipFill>
-        <p:spPr>
-          <a:xfrm>
-            <a:off x="8445016" y="3243380"/>
-            <a:ext cx="3203196" cy="370527"/>
-          </a:xfrm>
-          <a:prstGeom prst="rect">
-            <a:avLst/>
-          </a:prstGeom>
-        </p:spPr>
-      </p:pic>
-      <p:sp>
-        <p:nvSpPr>
-          <p:cNvPr id="41" name="Oval 40"/>
-          <p:cNvSpPr>
-            <a:spLocks noChangeAspect="1"/>
-          </p:cNvSpPr>
-          <p:nvPr/>
-        </p:nvSpPr>
-        <p:spPr>
-          <a:xfrm>
-            <a:off x="7782469" y="1950924"/>
-            <a:ext cx="266233" cy="266233"/>
-          </a:xfrm>
-          <a:prstGeom prst="ellipse">
-            <a:avLst/>
-          </a:prstGeom>
-          <a:solidFill>
-            <a:schemeClr val="accent1"/>
-          </a:solidFill>
-          <a:ln>
-            <a:solidFill>
-              <a:schemeClr val="accent1"/>
-            </a:solidFill>
-          </a:ln>
-        </p:spPr>
-        <p:style>
-          <a:lnRef idx="2">
-            <a:schemeClr val="accent1">
-              <a:shade val="50000"/>
-            </a:schemeClr>
-          </a:lnRef>
-          <a:fillRef idx="1">
-            <a:schemeClr val="accent1"/>
-          </a:fillRef>
-          <a:effectRef idx="0">
-            <a:schemeClr val="accent1"/>
-          </a:effectRef>
-          <a:fontRef idx="minor">
-            <a:schemeClr val="lt1"/>
-          </a:fontRef>
-        </p:style>
-        <p:txBody>
-          <a:bodyPr rtlCol="0" anchor="ctr"/>
-          <a:lstStyle/>
-          <a:p>
-            <a:pPr algn="ctr"/>
-            <a:endParaRPr lang="en-US"/>
-          </a:p>
-        </p:txBody>
-      </p:sp>
-      <p:sp>
-        <p:nvSpPr>
-          <p:cNvPr id="42" name="Oval 41"/>
-          <p:cNvSpPr>
-            <a:spLocks noChangeAspect="1"/>
-          </p:cNvSpPr>
-          <p:nvPr/>
-        </p:nvSpPr>
-        <p:spPr>
-          <a:xfrm>
-            <a:off x="10775871" y="1950925"/>
-            <a:ext cx="266233" cy="266233"/>
-          </a:xfrm>
-          <a:prstGeom prst="ellipse">
-            <a:avLst/>
-          </a:prstGeom>
-          <a:solidFill>
-            <a:schemeClr val="accent1"/>
-          </a:solidFill>
-          <a:ln>
-            <a:solidFill>
-              <a:schemeClr val="accent1"/>
-            </a:solidFill>
-          </a:ln>
-        </p:spPr>
-        <p:style>
-          <a:lnRef idx="2">
-            <a:schemeClr val="accent1">
-              <a:shade val="50000"/>
-            </a:schemeClr>
-          </a:lnRef>
-          <a:fillRef idx="1">
-            <a:schemeClr val="accent1"/>
-          </a:fillRef>
-          <a:effectRef idx="0">
-            <a:schemeClr val="accent1"/>
-          </a:effectRef>
-          <a:fontRef idx="minor">
-            <a:schemeClr val="lt1"/>
-          </a:fontRef>
-        </p:style>
-        <p:txBody>
-          <a:bodyPr rtlCol="0" anchor="ctr"/>
-          <a:lstStyle/>
-          <a:p>
-            <a:pPr algn="ctr"/>
-            <a:endParaRPr lang="en-US"/>
-          </a:p>
-        </p:txBody>
-      </p:sp>
-    </p:spTree>
-    <p:extLst>
-      <p:ext uri="{BB962C8B-B14F-4D97-AF65-F5344CB8AC3E}">
-        <p14:creationId xmlns:p14="http://schemas.microsoft.com/office/powerpoint/2010/main" val="953553063"/>
-      </p:ext>
-    </p:extLst>
-  </p:cSld>
-  <p:clrMapOvr>
-    <a:masterClrMapping/>
-  </p:clrMapOvr>
-  <p:timing>
-    <p:tnLst>
-      <p:par>
-        <p:cTn id="1" dur="indefinite" restart="never" nodeType="tmRoot"/>
-      </p:par>
-    </p:tnLst>
-  </p:timing>
-</p:sld>
-</file>
-
-<file path=ppt/slides/slide5.xml><?xml version="1.0" encoding="utf-8"?>
-<p:sld xmlns:a="http://schemas.openxmlformats.org/drawingml/2006/main" xmlns:r="http://schemas.openxmlformats.org/officeDocument/2006/relationships" xmlns:p="http://schemas.openxmlformats.org/presentationml/2006/main">
-  <p:cSld>
-    <p:spTree>
-      <p:nvGrpSpPr>
-        <p:cNvPr id="1" name=""/>
-        <p:cNvGrpSpPr/>
-        <p:nvPr/>
-      </p:nvGrpSpPr>
-      <p:grpSpPr>
-        <a:xfrm>
-          <a:off x="0" y="0"/>
-          <a:ext cx="0" cy="0"/>
-          <a:chOff x="0" y="0"/>
-          <a:chExt cx="0" cy="0"/>
-        </a:xfrm>
-      </p:grpSpPr>
-      <p:sp>
-        <p:nvSpPr>
-          <p:cNvPr id="6" name="Oval 5"/>
-          <p:cNvSpPr/>
-          <p:nvPr/>
-        </p:nvSpPr>
-        <p:spPr>
-          <a:xfrm>
-            <a:off x="726554" y="900523"/>
-            <a:ext cx="6646551" cy="2367035"/>
-          </a:xfrm>
-          <a:prstGeom prst="ellipse">
-            <a:avLst/>
-          </a:prstGeom>
-          <a:noFill/>
-          <a:ln>
-            <a:solidFill>
-              <a:schemeClr val="tx2"/>
-            </a:solidFill>
-          </a:ln>
-        </p:spPr>
-        <p:style>
-          <a:lnRef idx="2">
-            <a:schemeClr val="accent1">
-              <a:shade val="50000"/>
-            </a:schemeClr>
-          </a:lnRef>
-          <a:fillRef idx="1">
-            <a:schemeClr val="accent1"/>
-          </a:fillRef>
-          <a:effectRef idx="0">
-            <a:schemeClr val="accent1"/>
-          </a:effectRef>
-          <a:fontRef idx="minor">
-            <a:schemeClr val="lt1"/>
-          </a:fontRef>
-        </p:style>
-        <p:txBody>
-          <a:bodyPr rtlCol="0" anchor="ctr"/>
-          <a:lstStyle/>
-          <a:p>
-            <a:pPr algn="ctr"/>
-            <a:endParaRPr lang="en-US"/>
-          </a:p>
-        </p:txBody>
-      </p:sp>
-      <p:pic>
-        <p:nvPicPr>
-          <p:cNvPr id="16" name="Picture 15"/>
-          <p:cNvPicPr>
-            <a:picLocks noChangeAspect="1"/>
-          </p:cNvPicPr>
-          <p:nvPr/>
-        </p:nvPicPr>
-        <p:blipFill>
-          <a:blip r:embed="rId2"/>
-          <a:stretch>
-            <a:fillRect/>
-          </a:stretch>
-        </p:blipFill>
-        <p:spPr>
-          <a:xfrm>
-            <a:off x="5489051" y="7382719"/>
-            <a:ext cx="378114" cy="756227"/>
-          </a:xfrm>
-          <a:prstGeom prst="rect">
-            <a:avLst/>
-          </a:prstGeom>
-        </p:spPr>
-      </p:pic>
-      <p:sp>
-        <p:nvSpPr>
-          <p:cNvPr id="32" name="Rectangle 31"/>
-          <p:cNvSpPr/>
-          <p:nvPr/>
-        </p:nvSpPr>
-        <p:spPr>
-          <a:xfrm>
-            <a:off x="234270" y="520995"/>
-            <a:ext cx="11563499" cy="3246057"/>
-          </a:xfrm>
-          <a:prstGeom prst="rect">
-            <a:avLst/>
-          </a:prstGeom>
-          <a:noFill/>
-          <a:ln>
-            <a:solidFill>
-              <a:srgbClr val="00B050"/>
-            </a:solidFill>
-          </a:ln>
-        </p:spPr>
-        <p:style>
-          <a:lnRef idx="2">
-            <a:schemeClr val="accent1">
-              <a:shade val="50000"/>
-            </a:schemeClr>
-          </a:lnRef>
-          <a:fillRef idx="1">
-            <a:schemeClr val="accent1"/>
-          </a:fillRef>
-          <a:effectRef idx="0">
-            <a:schemeClr val="accent1"/>
-          </a:effectRef>
-          <a:fontRef idx="minor">
-            <a:schemeClr val="lt1"/>
-          </a:fontRef>
-        </p:style>
-        <p:txBody>
-          <a:bodyPr rtlCol="0" anchor="ctr"/>
-          <a:lstStyle/>
-          <a:p>
-            <a:pPr algn="ctr"/>
-            <a:endParaRPr lang="en-US"/>
-          </a:p>
-        </p:txBody>
-      </p:sp>
-      <p:pic>
-        <p:nvPicPr>
-          <p:cNvPr id="34" name="Picture 33"/>
-          <p:cNvPicPr>
-            <a:picLocks noChangeAspect="1"/>
-          </p:cNvPicPr>
-          <p:nvPr/>
-        </p:nvPicPr>
-        <p:blipFill>
-          <a:blip r:embed="rId3"/>
-          <a:stretch>
-            <a:fillRect/>
-          </a:stretch>
-        </p:blipFill>
-        <p:spPr>
-          <a:xfrm>
-            <a:off x="8445016" y="3243380"/>
-            <a:ext cx="3203196" cy="370527"/>
-          </a:xfrm>
-          <a:prstGeom prst="rect">
-            <a:avLst/>
-          </a:prstGeom>
-        </p:spPr>
-      </p:pic>
-      <p:sp>
-        <p:nvSpPr>
-          <p:cNvPr id="18" name="Oval 17"/>
-          <p:cNvSpPr/>
-          <p:nvPr/>
-        </p:nvSpPr>
-        <p:spPr>
-          <a:xfrm>
-            <a:off x="393404" y="637953"/>
-            <a:ext cx="9239693" cy="2966003"/>
-          </a:xfrm>
-          <a:prstGeom prst="ellipse">
-            <a:avLst/>
-          </a:prstGeom>
-          <a:noFill/>
-          <a:ln>
-            <a:solidFill>
-              <a:schemeClr val="tx2"/>
-            </a:solidFill>
-          </a:ln>
-        </p:spPr>
-        <p:style>
-          <a:lnRef idx="2">
-            <a:schemeClr val="accent1">
-              <a:shade val="50000"/>
-            </a:schemeClr>
-          </a:lnRef>
-          <a:fillRef idx="1">
-            <a:schemeClr val="accent1"/>
-          </a:fillRef>
-          <a:effectRef idx="0">
-            <a:schemeClr val="accent1"/>
-          </a:effectRef>
-          <a:fontRef idx="minor">
-            <a:schemeClr val="lt1"/>
-          </a:fontRef>
-        </p:style>
-        <p:txBody>
-          <a:bodyPr rtlCol="0" anchor="ctr"/>
-          <a:lstStyle/>
-          <a:p>
-            <a:pPr algn="ctr"/>
-            <a:endParaRPr lang="en-US"/>
-          </a:p>
-        </p:txBody>
-      </p:sp>
-      <p:pic>
-        <p:nvPicPr>
-          <p:cNvPr id="15" name="Picture 14"/>
-          <p:cNvPicPr>
-            <a:picLocks noChangeAspect="1"/>
-          </p:cNvPicPr>
-          <p:nvPr/>
-        </p:nvPicPr>
-        <p:blipFill>
-          <a:blip r:embed="rId4"/>
-          <a:stretch>
-            <a:fillRect/>
-          </a:stretch>
-        </p:blipFill>
-        <p:spPr>
-          <a:xfrm>
-            <a:off x="7927897" y="827558"/>
-            <a:ext cx="637148" cy="676815"/>
-          </a:xfrm>
-          <a:prstGeom prst="rect">
-            <a:avLst/>
-          </a:prstGeom>
-        </p:spPr>
-      </p:pic>
-      <p:pic>
-        <p:nvPicPr>
-          <p:cNvPr id="2" name="Picture 1"/>
-          <p:cNvPicPr>
-            <a:picLocks noChangeAspect="1"/>
-          </p:cNvPicPr>
-          <p:nvPr/>
-        </p:nvPicPr>
-        <p:blipFill>
-          <a:blip r:embed="rId5"/>
-          <a:stretch>
-            <a:fillRect/>
-          </a:stretch>
-        </p:blipFill>
-        <p:spPr>
-          <a:xfrm>
-            <a:off x="3518073" y="2725722"/>
-            <a:ext cx="821570" cy="762148"/>
-          </a:xfrm>
-          <a:prstGeom prst="rect">
-            <a:avLst/>
-          </a:prstGeom>
-        </p:spPr>
-      </p:pic>
-    </p:spTree>
-    <p:extLst>
-      <p:ext uri="{BB962C8B-B14F-4D97-AF65-F5344CB8AC3E}">
-        <p14:creationId xmlns:p14="http://schemas.microsoft.com/office/powerpoint/2010/main" val="1843355927"/>
-      </p:ext>
-    </p:extLst>
-  </p:cSld>
-  <p:clrMapOvr>
-    <a:masterClrMapping/>
-  </p:clrMapOvr>
-  <p:timing>
-    <p:tnLst>
-      <p:par>
-        <p:cTn id="1" dur="indefinite" restart="never" nodeType="tmRoot"/>
-      </p:par>
-    </p:tnLst>
-  </p:timing>
-</p:sld>
-</file>
-
-<file path=ppt/slides/slide6.xml><?xml version="1.0" encoding="utf-8"?>
-<p:sld xmlns:a="http://schemas.openxmlformats.org/drawingml/2006/main" xmlns:r="http://schemas.openxmlformats.org/officeDocument/2006/relationships" xmlns:p="http://schemas.openxmlformats.org/presentationml/2006/main">
-  <p:cSld>
-    <p:spTree>
-      <p:nvGrpSpPr>
-        <p:cNvPr id="1" name=""/>
-        <p:cNvGrpSpPr/>
-        <p:nvPr/>
-      </p:nvGrpSpPr>
-      <p:grpSpPr>
-        <a:xfrm>
-          <a:off x="0" y="0"/>
-          <a:ext cx="0" cy="0"/>
-          <a:chOff x="0" y="0"/>
-          <a:chExt cx="0" cy="0"/>
-        </a:xfrm>
-      </p:grpSpPr>
-      <p:cxnSp>
-        <p:nvCxnSpPr>
-          <p:cNvPr id="12" name="Straight Connector 11"/>
-          <p:cNvCxnSpPr>
-            <a:stCxn id="41" idx="1"/>
-            <a:endCxn id="7" idx="5"/>
-          </p:cNvCxnSpPr>
-          <p:nvPr/>
-        </p:nvCxnSpPr>
-        <p:spPr>
-          <a:xfrm flipH="1" flipV="1">
-            <a:off x="6110146" y="1249326"/>
-            <a:ext cx="1187470" cy="740588"/>
-          </a:xfrm>
-          <a:prstGeom prst="line">
-            <a:avLst/>
-          </a:prstGeom>
-          <a:ln w="25400">
-            <a:solidFill>
-              <a:schemeClr val="tx1">
-                <a:lumMod val="50000"/>
-                <a:lumOff val="50000"/>
-              </a:schemeClr>
-            </a:solidFill>
-            <a:prstDash val="sysDot"/>
-            <a:headEnd type="none" w="lg" len="lg"/>
-            <a:tailEnd type="none" w="lg" len="lg"/>
-          </a:ln>
-        </p:spPr>
-        <p:style>
-          <a:lnRef idx="1">
-            <a:schemeClr val="accent1"/>
-          </a:lnRef>
-          <a:fillRef idx="0">
-            <a:schemeClr val="accent1"/>
-          </a:fillRef>
-          <a:effectRef idx="0">
-            <a:schemeClr val="accent1"/>
-          </a:effectRef>
-          <a:fontRef idx="minor">
-            <a:schemeClr val="tx1"/>
-          </a:fontRef>
-        </p:style>
-      </p:cxnSp>
-      <p:cxnSp>
-        <p:nvCxnSpPr>
-          <p:cNvPr id="11" name="Straight Connector 10"/>
-          <p:cNvCxnSpPr>
-            <a:stCxn id="41" idx="6"/>
-            <a:endCxn id="42" idx="2"/>
-          </p:cNvCxnSpPr>
-          <p:nvPr/>
-        </p:nvCxnSpPr>
-        <p:spPr>
-          <a:xfrm>
-            <a:off x="7524860" y="2084042"/>
-            <a:ext cx="3251011" cy="0"/>
-          </a:xfrm>
-          <a:prstGeom prst="line">
-            <a:avLst/>
-          </a:prstGeom>
-          <a:ln w="25400">
-            <a:solidFill>
-              <a:schemeClr val="tx1">
-                <a:lumMod val="50000"/>
-                <a:lumOff val="50000"/>
-              </a:schemeClr>
-            </a:solidFill>
-            <a:prstDash val="sysDot"/>
-            <a:headEnd type="none" w="lg" len="lg"/>
-            <a:tailEnd type="none" w="lg" len="lg"/>
-          </a:ln>
-        </p:spPr>
-        <p:style>
-          <a:lnRef idx="1">
-            <a:schemeClr val="accent1"/>
-          </a:lnRef>
-          <a:fillRef idx="0">
-            <a:schemeClr val="accent1"/>
-          </a:fillRef>
-          <a:effectRef idx="0">
-            <a:schemeClr val="accent1"/>
-          </a:effectRef>
-          <a:fontRef idx="minor">
-            <a:schemeClr val="tx1"/>
-          </a:fontRef>
-        </p:style>
-      </p:cxnSp>
-      <p:sp>
-        <p:nvSpPr>
-          <p:cNvPr id="6" name="Oval 5"/>
-          <p:cNvSpPr/>
-          <p:nvPr/>
-        </p:nvSpPr>
-        <p:spPr>
-          <a:xfrm>
-            <a:off x="726554" y="900523"/>
-            <a:ext cx="6646551" cy="2367035"/>
-          </a:xfrm>
-          <a:prstGeom prst="ellipse">
-            <a:avLst/>
-          </a:prstGeom>
-          <a:noFill/>
-          <a:ln>
-            <a:solidFill>
-              <a:schemeClr val="tx2"/>
-            </a:solidFill>
-          </a:ln>
-        </p:spPr>
-        <p:style>
-          <a:lnRef idx="2">
-            <a:schemeClr val="accent1">
-              <a:shade val="50000"/>
-            </a:schemeClr>
-          </a:lnRef>
-          <a:fillRef idx="1">
-            <a:schemeClr val="accent1"/>
-          </a:fillRef>
-          <a:effectRef idx="0">
-            <a:schemeClr val="accent1"/>
-          </a:effectRef>
-          <a:fontRef idx="minor">
-            <a:schemeClr val="lt1"/>
-          </a:fontRef>
-        </p:style>
-        <p:txBody>
-          <a:bodyPr rtlCol="0" anchor="ctr"/>
-          <a:lstStyle/>
-          <a:p>
-            <a:pPr algn="ctr"/>
-            <a:endParaRPr lang="en-US"/>
-          </a:p>
-        </p:txBody>
-      </p:sp>
-      <p:sp>
-        <p:nvSpPr>
-          <p:cNvPr id="7" name="Oval 6"/>
-          <p:cNvSpPr>
-            <a:spLocks noChangeAspect="1"/>
-          </p:cNvSpPr>
-          <p:nvPr/>
-        </p:nvSpPr>
-        <p:spPr>
-          <a:xfrm>
-            <a:off x="5882902" y="1022082"/>
-            <a:ext cx="266233" cy="266233"/>
-          </a:xfrm>
-          <a:prstGeom prst="ellipse">
-            <a:avLst/>
-          </a:prstGeom>
-          <a:solidFill>
-            <a:schemeClr val="accent1"/>
-          </a:solidFill>
-          <a:ln>
-            <a:solidFill>
-              <a:schemeClr val="accent1"/>
-            </a:solidFill>
-          </a:ln>
-        </p:spPr>
-        <p:style>
-          <a:lnRef idx="2">
-            <a:schemeClr val="accent1">
-              <a:shade val="50000"/>
-            </a:schemeClr>
-          </a:lnRef>
-          <a:fillRef idx="1">
-            <a:schemeClr val="accent1"/>
-          </a:fillRef>
-          <a:effectRef idx="0">
-            <a:schemeClr val="accent1"/>
-          </a:effectRef>
-          <a:fontRef idx="minor">
-            <a:schemeClr val="lt1"/>
-          </a:fontRef>
-        </p:style>
-        <p:txBody>
-          <a:bodyPr rtlCol="0" anchor="ctr"/>
-          <a:lstStyle/>
-          <a:p>
-            <a:pPr algn="ctr"/>
-            <a:endParaRPr lang="en-US"/>
-          </a:p>
-        </p:txBody>
-      </p:sp>
-      <p:pic>
-        <p:nvPicPr>
-          <p:cNvPr id="16" name="Picture 15"/>
-          <p:cNvPicPr>
-            <a:picLocks noChangeAspect="1"/>
-          </p:cNvPicPr>
-          <p:nvPr/>
-        </p:nvPicPr>
-        <p:blipFill>
-          <a:blip r:embed="rId2"/>
-          <a:stretch>
-            <a:fillRect/>
-          </a:stretch>
-        </p:blipFill>
-        <p:spPr>
-          <a:xfrm>
-            <a:off x="5489051" y="7382719"/>
-            <a:ext cx="378114" cy="756227"/>
-          </a:xfrm>
-          <a:prstGeom prst="rect">
-            <a:avLst/>
-          </a:prstGeom>
-        </p:spPr>
-      </p:pic>
-      <p:pic>
-        <p:nvPicPr>
-          <p:cNvPr id="17" name="Picture 16"/>
-          <p:cNvPicPr>
-            <a:picLocks noChangeAspect="1"/>
-          </p:cNvPicPr>
-          <p:nvPr/>
-        </p:nvPicPr>
-        <p:blipFill>
-          <a:blip r:embed="rId3"/>
-          <a:stretch>
-            <a:fillRect/>
-          </a:stretch>
-        </p:blipFill>
-        <p:spPr>
-          <a:xfrm>
-            <a:off x="10775871" y="2217158"/>
-            <a:ext cx="485284" cy="508564"/>
-          </a:xfrm>
-          <a:prstGeom prst="rect">
-            <a:avLst/>
-          </a:prstGeom>
-        </p:spPr>
-      </p:pic>
-      <p:sp>
-        <p:nvSpPr>
-          <p:cNvPr id="32" name="Rectangle 31"/>
-          <p:cNvSpPr/>
-          <p:nvPr/>
-        </p:nvSpPr>
-        <p:spPr>
-          <a:xfrm>
-            <a:off x="234270" y="520995"/>
-            <a:ext cx="11563499" cy="3246057"/>
-          </a:xfrm>
-          <a:prstGeom prst="rect">
-            <a:avLst/>
-          </a:prstGeom>
-          <a:noFill/>
-          <a:ln>
-            <a:solidFill>
-              <a:srgbClr val="00B050"/>
-            </a:solidFill>
-          </a:ln>
-        </p:spPr>
-        <p:style>
-          <a:lnRef idx="2">
-            <a:schemeClr val="accent1">
-              <a:shade val="50000"/>
-            </a:schemeClr>
-          </a:lnRef>
-          <a:fillRef idx="1">
-            <a:schemeClr val="accent1"/>
-          </a:fillRef>
-          <a:effectRef idx="0">
-            <a:schemeClr val="accent1"/>
-          </a:effectRef>
-          <a:fontRef idx="minor">
-            <a:schemeClr val="lt1"/>
-          </a:fontRef>
-        </p:style>
-        <p:txBody>
-          <a:bodyPr rtlCol="0" anchor="ctr"/>
-          <a:lstStyle/>
-          <a:p>
-            <a:pPr algn="ctr"/>
-            <a:endParaRPr lang="en-US"/>
-          </a:p>
-        </p:txBody>
-      </p:sp>
-      <p:pic>
-        <p:nvPicPr>
-          <p:cNvPr id="34" name="Picture 33"/>
-          <p:cNvPicPr>
-            <a:picLocks noChangeAspect="1"/>
-          </p:cNvPicPr>
-          <p:nvPr/>
-        </p:nvPicPr>
-        <p:blipFill>
-          <a:blip r:embed="rId4"/>
-          <a:stretch>
-            <a:fillRect/>
-          </a:stretch>
-        </p:blipFill>
-        <p:spPr>
-          <a:xfrm>
-            <a:off x="8445016" y="3243380"/>
-            <a:ext cx="3203196" cy="370527"/>
-          </a:xfrm>
-          <a:prstGeom prst="rect">
-            <a:avLst/>
-          </a:prstGeom>
-        </p:spPr>
-      </p:pic>
-      <p:sp>
-        <p:nvSpPr>
-          <p:cNvPr id="41" name="Oval 40"/>
-          <p:cNvSpPr>
-            <a:spLocks noChangeAspect="1"/>
-          </p:cNvSpPr>
-          <p:nvPr/>
-        </p:nvSpPr>
-        <p:spPr>
-          <a:xfrm>
-            <a:off x="7258627" y="1950925"/>
-            <a:ext cx="266233" cy="266233"/>
-          </a:xfrm>
-          <a:prstGeom prst="ellipse">
-            <a:avLst/>
-          </a:prstGeom>
-          <a:solidFill>
-            <a:schemeClr val="accent1"/>
-          </a:solidFill>
-          <a:ln>
-            <a:solidFill>
-              <a:schemeClr val="accent1"/>
-            </a:solidFill>
-          </a:ln>
-        </p:spPr>
-        <p:style>
-          <a:lnRef idx="2">
-            <a:schemeClr val="accent1">
-              <a:shade val="50000"/>
-            </a:schemeClr>
-          </a:lnRef>
-          <a:fillRef idx="1">
-            <a:schemeClr val="accent1"/>
-          </a:fillRef>
-          <a:effectRef idx="0">
-            <a:schemeClr val="accent1"/>
-          </a:effectRef>
-          <a:fontRef idx="minor">
-            <a:schemeClr val="lt1"/>
-          </a:fontRef>
-        </p:style>
-        <p:txBody>
-          <a:bodyPr rtlCol="0" anchor="ctr"/>
-          <a:lstStyle/>
-          <a:p>
-            <a:pPr algn="ctr"/>
-            <a:endParaRPr lang="en-US"/>
-          </a:p>
-        </p:txBody>
-      </p:sp>
-      <p:sp>
-        <p:nvSpPr>
-          <p:cNvPr id="42" name="Oval 41"/>
-          <p:cNvSpPr>
-            <a:spLocks noChangeAspect="1"/>
-          </p:cNvSpPr>
-          <p:nvPr/>
-        </p:nvSpPr>
-        <p:spPr>
-          <a:xfrm>
-            <a:off x="10775871" y="1950925"/>
-            <a:ext cx="266233" cy="266233"/>
-          </a:xfrm>
-          <a:prstGeom prst="ellipse">
-            <a:avLst/>
-          </a:prstGeom>
-          <a:solidFill>
-            <a:schemeClr val="accent1"/>
-          </a:solidFill>
-          <a:ln>
-            <a:solidFill>
-              <a:schemeClr val="accent1"/>
-            </a:solidFill>
-          </a:ln>
-        </p:spPr>
-        <p:style>
-          <a:lnRef idx="2">
-            <a:schemeClr val="accent1">
-              <a:shade val="50000"/>
-            </a:schemeClr>
-          </a:lnRef>
-          <a:fillRef idx="1">
-            <a:schemeClr val="accent1"/>
-          </a:fillRef>
-          <a:effectRef idx="0">
-            <a:schemeClr val="accent1"/>
-          </a:effectRef>
-          <a:fontRef idx="minor">
-            <a:schemeClr val="lt1"/>
-          </a:fontRef>
-        </p:style>
-        <p:txBody>
-          <a:bodyPr rtlCol="0" anchor="ctr"/>
-          <a:lstStyle/>
-          <a:p>
-            <a:pPr algn="ctr"/>
-            <a:endParaRPr lang="en-US"/>
-          </a:p>
-        </p:txBody>
-      </p:sp>
-      <p:sp>
-        <p:nvSpPr>
-          <p:cNvPr id="18" name="Oval 17"/>
-          <p:cNvSpPr/>
-          <p:nvPr/>
-        </p:nvSpPr>
-        <p:spPr>
-          <a:xfrm>
-            <a:off x="393404" y="637953"/>
-            <a:ext cx="9239693" cy="2966003"/>
-          </a:xfrm>
-          <a:prstGeom prst="ellipse">
-            <a:avLst/>
-          </a:prstGeom>
-          <a:noFill/>
-          <a:ln>
-            <a:solidFill>
-              <a:schemeClr val="tx2"/>
-            </a:solidFill>
-          </a:ln>
-        </p:spPr>
-        <p:style>
-          <a:lnRef idx="2">
-            <a:schemeClr val="accent1">
-              <a:shade val="50000"/>
-            </a:schemeClr>
-          </a:lnRef>
-          <a:fillRef idx="1">
-            <a:schemeClr val="accent1"/>
-          </a:fillRef>
-          <a:effectRef idx="0">
-            <a:schemeClr val="accent1"/>
-          </a:effectRef>
-          <a:fontRef idx="minor">
-            <a:schemeClr val="lt1"/>
-          </a:fontRef>
-        </p:style>
-        <p:txBody>
-          <a:bodyPr rtlCol="0" anchor="ctr"/>
-          <a:lstStyle/>
-          <a:p>
-            <a:pPr algn="ctr"/>
-            <a:endParaRPr lang="en-US"/>
-          </a:p>
-        </p:txBody>
-      </p:sp>
-      <p:pic>
-        <p:nvPicPr>
-          <p:cNvPr id="15" name="Picture 14"/>
-          <p:cNvPicPr>
-            <a:picLocks noChangeAspect="1"/>
-          </p:cNvPicPr>
-          <p:nvPr/>
-        </p:nvPicPr>
-        <p:blipFill>
-          <a:blip r:embed="rId5"/>
-          <a:stretch>
-            <a:fillRect/>
-          </a:stretch>
-        </p:blipFill>
-        <p:spPr>
-          <a:xfrm>
-            <a:off x="7927897" y="827558"/>
-            <a:ext cx="637148" cy="676815"/>
-          </a:xfrm>
-          <a:prstGeom prst="rect">
-            <a:avLst/>
-          </a:prstGeom>
-        </p:spPr>
-      </p:pic>
-      <p:pic>
-        <p:nvPicPr>
-          <p:cNvPr id="2" name="Picture 1"/>
-          <p:cNvPicPr>
-            <a:picLocks noChangeAspect="1"/>
-          </p:cNvPicPr>
-          <p:nvPr/>
-        </p:nvPicPr>
-        <p:blipFill>
-          <a:blip r:embed="rId6"/>
-          <a:stretch>
-            <a:fillRect/>
-          </a:stretch>
-        </p:blipFill>
-        <p:spPr>
-          <a:xfrm>
-            <a:off x="3518073" y="2725722"/>
-            <a:ext cx="821570" cy="762148"/>
-          </a:xfrm>
-          <a:prstGeom prst="rect">
-            <a:avLst/>
-          </a:prstGeom>
-        </p:spPr>
-      </p:pic>
-      <p:pic>
-        <p:nvPicPr>
-          <p:cNvPr id="3" name="Picture 2"/>
-          <p:cNvPicPr>
-            <a:picLocks noChangeAspect="1"/>
-          </p:cNvPicPr>
-          <p:nvPr/>
-        </p:nvPicPr>
-        <p:blipFill>
-          <a:blip r:embed="rId7"/>
-          <a:stretch>
-            <a:fillRect/>
-          </a:stretch>
-        </p:blipFill>
-        <p:spPr>
-          <a:xfrm>
-            <a:off x="5864015" y="1349982"/>
-            <a:ext cx="328904" cy="672108"/>
-          </a:xfrm>
-          <a:prstGeom prst="rect">
-            <a:avLst/>
-          </a:prstGeom>
-        </p:spPr>
-      </p:pic>
-      <p:pic>
-        <p:nvPicPr>
-          <p:cNvPr id="4" name="Picture 3"/>
-          <p:cNvPicPr>
-            <a:picLocks noChangeAspect="1"/>
-          </p:cNvPicPr>
-          <p:nvPr/>
-        </p:nvPicPr>
-        <p:blipFill>
-          <a:blip r:embed="rId8"/>
-          <a:stretch>
-            <a:fillRect/>
-          </a:stretch>
-        </p:blipFill>
-        <p:spPr>
-          <a:xfrm>
-            <a:off x="7454784" y="2403156"/>
-            <a:ext cx="345669" cy="575482"/>
-          </a:xfrm>
-          <a:prstGeom prst="rect">
-            <a:avLst/>
-          </a:prstGeom>
-        </p:spPr>
-      </p:pic>
-    </p:spTree>
-    <p:extLst>
-      <p:ext uri="{BB962C8B-B14F-4D97-AF65-F5344CB8AC3E}">
-        <p14:creationId xmlns:p14="http://schemas.microsoft.com/office/powerpoint/2010/main" val="1908504036"/>
-      </p:ext>
-    </p:extLst>
-  </p:cSld>
-  <p:clrMapOvr>
-    <a:masterClrMapping/>
-  </p:clrMapOvr>
-  <p:timing>
-    <p:tnLst>
-      <p:par>
-        <p:cTn id="1" dur="indefinite" restart="never" nodeType="tmRoot"/>
-      </p:par>
-    </p:tnLst>
-  </p:timing>
-</p:sld>
-</file>
-
-<file path=ppt/slides/slide7.xml><?xml version="1.0" encoding="utf-8"?>
-<p:sld xmlns:a="http://schemas.openxmlformats.org/drawingml/2006/main" xmlns:r="http://schemas.openxmlformats.org/officeDocument/2006/relationships" xmlns:p="http://schemas.openxmlformats.org/presentationml/2006/main">
-  <p:cSld>
-    <p:spTree>
-      <p:nvGrpSpPr>
-        <p:cNvPr id="1" name=""/>
-        <p:cNvGrpSpPr/>
-        <p:nvPr/>
-      </p:nvGrpSpPr>
-      <p:grpSpPr>
-        <a:xfrm>
-          <a:off x="0" y="0"/>
-          <a:ext cx="0" cy="0"/>
-          <a:chOff x="0" y="0"/>
-          <a:chExt cx="0" cy="0"/>
-        </a:xfrm>
-      </p:grpSpPr>
       <p:pic>
         <p:nvPicPr>
           <p:cNvPr id="34" name="Picture 33"/>
@@ -19376,7 +17846,7 @@
 </p:sld>
 </file>
 
-<file path=ppt/slides/slide8.xml><?xml version="1.0" encoding="utf-8"?>
+<file path=ppt/slides/slide5.xml><?xml version="1.0" encoding="utf-8"?>
 <p:sld xmlns:a="http://schemas.openxmlformats.org/drawingml/2006/main" xmlns:r="http://schemas.openxmlformats.org/officeDocument/2006/relationships" xmlns:p="http://schemas.openxmlformats.org/presentationml/2006/main">
   <p:cSld>
     <p:spTree>
@@ -20701,636 +19171,6 @@
     <p:extLst>
       <p:ext uri="{BB962C8B-B14F-4D97-AF65-F5344CB8AC3E}">
         <p14:creationId xmlns:p14="http://schemas.microsoft.com/office/powerpoint/2010/main" val="1013217698"/>
-      </p:ext>
-    </p:extLst>
-  </p:cSld>
-  <p:clrMapOvr>
-    <a:masterClrMapping/>
-  </p:clrMapOvr>
-  <p:timing>
-    <p:tnLst>
-      <p:par>
-        <p:cTn id="1" dur="indefinite" restart="never" nodeType="tmRoot"/>
-      </p:par>
-    </p:tnLst>
-  </p:timing>
-</p:sld>
-</file>
-
-<file path=ppt/slides/slide9.xml><?xml version="1.0" encoding="utf-8"?>
-<p:sld xmlns:a="http://schemas.openxmlformats.org/drawingml/2006/main" xmlns:r="http://schemas.openxmlformats.org/officeDocument/2006/relationships" xmlns:p="http://schemas.openxmlformats.org/presentationml/2006/main">
-  <p:cSld>
-    <p:spTree>
-      <p:nvGrpSpPr>
-        <p:cNvPr id="1" name=""/>
-        <p:cNvGrpSpPr/>
-        <p:nvPr/>
-      </p:nvGrpSpPr>
-      <p:grpSpPr>
-        <a:xfrm>
-          <a:off x="0" y="0"/>
-          <a:ext cx="0" cy="0"/>
-          <a:chOff x="0" y="0"/>
-          <a:chExt cx="0" cy="0"/>
-        </a:xfrm>
-      </p:grpSpPr>
-      <p:cxnSp>
-        <p:nvCxnSpPr>
-          <p:cNvPr id="12" name="Straight Connector 11"/>
-          <p:cNvCxnSpPr>
-            <a:stCxn id="41" idx="1"/>
-            <a:endCxn id="7" idx="5"/>
-          </p:cNvCxnSpPr>
-          <p:nvPr/>
-        </p:nvCxnSpPr>
-        <p:spPr>
-          <a:xfrm flipH="1" flipV="1">
-            <a:off x="6853198" y="1478693"/>
-            <a:ext cx="921065" cy="1558130"/>
-          </a:xfrm>
-          <a:prstGeom prst="line">
-            <a:avLst/>
-          </a:prstGeom>
-          <a:ln w="25400">
-            <a:solidFill>
-              <a:schemeClr val="tx1">
-                <a:lumMod val="50000"/>
-                <a:lumOff val="50000"/>
-              </a:schemeClr>
-            </a:solidFill>
-            <a:prstDash val="sysDot"/>
-            <a:headEnd type="none" w="lg" len="lg"/>
-            <a:tailEnd type="none" w="lg" len="lg"/>
-          </a:ln>
-        </p:spPr>
-        <p:style>
-          <a:lnRef idx="1">
-            <a:schemeClr val="accent1"/>
-          </a:lnRef>
-          <a:fillRef idx="0">
-            <a:schemeClr val="accent1"/>
-          </a:fillRef>
-          <a:effectRef idx="0">
-            <a:schemeClr val="accent1"/>
-          </a:effectRef>
-          <a:fontRef idx="minor">
-            <a:schemeClr val="tx1"/>
-          </a:fontRef>
-        </p:style>
-      </p:cxnSp>
-      <p:cxnSp>
-        <p:nvCxnSpPr>
-          <p:cNvPr id="11" name="Straight Connector 10"/>
-          <p:cNvCxnSpPr>
-            <a:endCxn id="42" idx="2"/>
-          </p:cNvCxnSpPr>
-          <p:nvPr/>
-        </p:nvCxnSpPr>
-        <p:spPr>
-          <a:xfrm>
-            <a:off x="8047117" y="3123190"/>
-            <a:ext cx="2790956" cy="0"/>
-          </a:xfrm>
-          <a:prstGeom prst="line">
-            <a:avLst/>
-          </a:prstGeom>
-          <a:ln w="25400">
-            <a:solidFill>
-              <a:schemeClr val="tx1">
-                <a:lumMod val="50000"/>
-                <a:lumOff val="50000"/>
-              </a:schemeClr>
-            </a:solidFill>
-            <a:prstDash val="sysDot"/>
-            <a:headEnd type="none" w="lg" len="lg"/>
-            <a:tailEnd type="none" w="lg" len="lg"/>
-          </a:ln>
-        </p:spPr>
-        <p:style>
-          <a:lnRef idx="1">
-            <a:schemeClr val="accent1"/>
-          </a:lnRef>
-          <a:fillRef idx="0">
-            <a:schemeClr val="accent1"/>
-          </a:fillRef>
-          <a:effectRef idx="0">
-            <a:schemeClr val="accent1"/>
-          </a:effectRef>
-          <a:fontRef idx="minor">
-            <a:schemeClr val="tx1"/>
-          </a:fontRef>
-        </p:style>
-      </p:cxnSp>
-      <p:sp>
-        <p:nvSpPr>
-          <p:cNvPr id="6" name="Oval 5"/>
-          <p:cNvSpPr/>
-          <p:nvPr/>
-        </p:nvSpPr>
-        <p:spPr>
-          <a:xfrm>
-            <a:off x="701745" y="663526"/>
-            <a:ext cx="7204130" cy="5694744"/>
-          </a:xfrm>
-          <a:prstGeom prst="ellipse">
-            <a:avLst/>
-          </a:prstGeom>
-          <a:noFill/>
-          <a:ln>
-            <a:solidFill>
-              <a:schemeClr val="tx2"/>
-            </a:solidFill>
-          </a:ln>
-        </p:spPr>
-        <p:style>
-          <a:lnRef idx="2">
-            <a:schemeClr val="accent1">
-              <a:shade val="50000"/>
-            </a:schemeClr>
-          </a:lnRef>
-          <a:fillRef idx="1">
-            <a:schemeClr val="accent1"/>
-          </a:fillRef>
-          <a:effectRef idx="0">
-            <a:schemeClr val="accent1"/>
-          </a:effectRef>
-          <a:fontRef idx="minor">
-            <a:schemeClr val="lt1"/>
-          </a:fontRef>
-        </p:style>
-        <p:txBody>
-          <a:bodyPr rtlCol="0" anchor="ctr"/>
-          <a:lstStyle/>
-          <a:p>
-            <a:pPr algn="ctr"/>
-            <a:endParaRPr lang="en-US"/>
-          </a:p>
-        </p:txBody>
-      </p:sp>
-      <p:sp>
-        <p:nvSpPr>
-          <p:cNvPr id="7" name="Oval 6"/>
-          <p:cNvSpPr>
-            <a:spLocks noChangeAspect="1"/>
-          </p:cNvSpPr>
-          <p:nvPr/>
-        </p:nvSpPr>
-        <p:spPr>
-          <a:xfrm>
-            <a:off x="6625954" y="1251449"/>
-            <a:ext cx="266233" cy="266233"/>
-          </a:xfrm>
-          <a:prstGeom prst="ellipse">
-            <a:avLst/>
-          </a:prstGeom>
-          <a:solidFill>
-            <a:schemeClr val="accent1"/>
-          </a:solidFill>
-          <a:ln>
-            <a:solidFill>
-              <a:schemeClr val="accent1"/>
-            </a:solidFill>
-          </a:ln>
-        </p:spPr>
-        <p:style>
-          <a:lnRef idx="2">
-            <a:schemeClr val="accent1">
-              <a:shade val="50000"/>
-            </a:schemeClr>
-          </a:lnRef>
-          <a:fillRef idx="1">
-            <a:schemeClr val="accent1"/>
-          </a:fillRef>
-          <a:effectRef idx="0">
-            <a:schemeClr val="accent1"/>
-          </a:effectRef>
-          <a:fontRef idx="minor">
-            <a:schemeClr val="lt1"/>
-          </a:fontRef>
-        </p:style>
-        <p:txBody>
-          <a:bodyPr rtlCol="0" anchor="ctr"/>
-          <a:lstStyle/>
-          <a:p>
-            <a:pPr algn="ctr"/>
-            <a:endParaRPr lang="en-US"/>
-          </a:p>
-        </p:txBody>
-      </p:sp>
-      <p:pic>
-        <p:nvPicPr>
-          <p:cNvPr id="14" name="Picture 13"/>
-          <p:cNvPicPr>
-            <a:picLocks noChangeAspect="1"/>
-          </p:cNvPicPr>
-          <p:nvPr/>
-        </p:nvPicPr>
-        <p:blipFill>
-          <a:blip r:embed="rId2"/>
-          <a:stretch>
-            <a:fillRect/>
-          </a:stretch>
-        </p:blipFill>
-        <p:spPr>
-          <a:xfrm>
-            <a:off x="6564579" y="1598033"/>
-            <a:ext cx="385973" cy="806340"/>
-          </a:xfrm>
-          <a:prstGeom prst="rect">
-            <a:avLst/>
-          </a:prstGeom>
-        </p:spPr>
-      </p:pic>
-      <p:pic>
-        <p:nvPicPr>
-          <p:cNvPr id="15" name="Picture 14"/>
-          <p:cNvPicPr>
-            <a:picLocks noChangeAspect="1"/>
-          </p:cNvPicPr>
-          <p:nvPr/>
-        </p:nvPicPr>
-        <p:blipFill>
-          <a:blip r:embed="rId3"/>
-          <a:stretch>
-            <a:fillRect/>
-          </a:stretch>
-        </p:blipFill>
-        <p:spPr>
-          <a:xfrm>
-            <a:off x="4104142" y="5502556"/>
-            <a:ext cx="637148" cy="676815"/>
-          </a:xfrm>
-          <a:prstGeom prst="rect">
-            <a:avLst/>
-          </a:prstGeom>
-        </p:spPr>
-      </p:pic>
-      <p:pic>
-        <p:nvPicPr>
-          <p:cNvPr id="16" name="Picture 15"/>
-          <p:cNvPicPr>
-            <a:picLocks noChangeAspect="1"/>
-          </p:cNvPicPr>
-          <p:nvPr/>
-        </p:nvPicPr>
-        <p:blipFill>
-          <a:blip r:embed="rId4"/>
-          <a:stretch>
-            <a:fillRect/>
-          </a:stretch>
-        </p:blipFill>
-        <p:spPr>
-          <a:xfrm>
-            <a:off x="5489051" y="7382719"/>
-            <a:ext cx="378114" cy="756227"/>
-          </a:xfrm>
-          <a:prstGeom prst="rect">
-            <a:avLst/>
-          </a:prstGeom>
-        </p:spPr>
-      </p:pic>
-      <p:pic>
-        <p:nvPicPr>
-          <p:cNvPr id="17" name="Picture 16"/>
-          <p:cNvPicPr>
-            <a:picLocks noChangeAspect="1"/>
-          </p:cNvPicPr>
-          <p:nvPr/>
-        </p:nvPicPr>
-        <p:blipFill>
-          <a:blip r:embed="rId5"/>
-          <a:stretch>
-            <a:fillRect/>
-          </a:stretch>
-        </p:blipFill>
-        <p:spPr>
-          <a:xfrm>
-            <a:off x="10799462" y="3428646"/>
-            <a:ext cx="485284" cy="508564"/>
-          </a:xfrm>
-          <a:prstGeom prst="rect">
-            <a:avLst/>
-          </a:prstGeom>
-        </p:spPr>
-      </p:pic>
-      <p:pic>
-        <p:nvPicPr>
-          <p:cNvPr id="28" name="Picture 27"/>
-          <p:cNvPicPr>
-            <a:picLocks noChangeAspect="1"/>
-          </p:cNvPicPr>
-          <p:nvPr/>
-        </p:nvPicPr>
-        <p:blipFill>
-          <a:blip r:embed="rId6"/>
-          <a:stretch>
-            <a:fillRect/>
-          </a:stretch>
-        </p:blipFill>
-        <p:spPr>
-          <a:xfrm>
-            <a:off x="7941708" y="3451556"/>
-            <a:ext cx="480222" cy="585549"/>
-          </a:xfrm>
-          <a:prstGeom prst="rect">
-            <a:avLst/>
-          </a:prstGeom>
-        </p:spPr>
-      </p:pic>
-      <p:sp>
-        <p:nvSpPr>
-          <p:cNvPr id="32" name="Rectangle 31"/>
-          <p:cNvSpPr/>
-          <p:nvPr/>
-        </p:nvSpPr>
-        <p:spPr>
-          <a:xfrm>
-            <a:off x="85415" y="180005"/>
-            <a:ext cx="11563499" cy="6497281"/>
-          </a:xfrm>
-          <a:prstGeom prst="rect">
-            <a:avLst/>
-          </a:prstGeom>
-          <a:noFill/>
-          <a:ln>
-            <a:solidFill>
-              <a:srgbClr val="00B050"/>
-            </a:solidFill>
-          </a:ln>
-        </p:spPr>
-        <p:style>
-          <a:lnRef idx="2">
-            <a:schemeClr val="accent1">
-              <a:shade val="50000"/>
-            </a:schemeClr>
-          </a:lnRef>
-          <a:fillRef idx="1">
-            <a:schemeClr val="accent1"/>
-          </a:fillRef>
-          <a:effectRef idx="0">
-            <a:schemeClr val="accent1"/>
-          </a:effectRef>
-          <a:fontRef idx="minor">
-            <a:schemeClr val="lt1"/>
-          </a:fontRef>
-        </p:style>
-        <p:txBody>
-          <a:bodyPr rtlCol="0" anchor="ctr"/>
-          <a:lstStyle/>
-          <a:p>
-            <a:pPr algn="ctr"/>
-            <a:endParaRPr lang="en-US"/>
-          </a:p>
-        </p:txBody>
-      </p:sp>
-      <p:pic>
-        <p:nvPicPr>
-          <p:cNvPr id="34" name="Picture 33"/>
-          <p:cNvPicPr>
-            <a:picLocks noChangeAspect="1"/>
-          </p:cNvPicPr>
-          <p:nvPr/>
-        </p:nvPicPr>
-        <p:blipFill>
-          <a:blip r:embed="rId7"/>
-          <a:stretch>
-            <a:fillRect/>
-          </a:stretch>
-        </p:blipFill>
-        <p:spPr>
-          <a:xfrm>
-            <a:off x="8230297" y="6147760"/>
-            <a:ext cx="3203196" cy="370527"/>
-          </a:xfrm>
-          <a:prstGeom prst="rect">
-            <a:avLst/>
-          </a:prstGeom>
-        </p:spPr>
-      </p:pic>
-      <p:sp>
-        <p:nvSpPr>
-          <p:cNvPr id="41" name="Oval 40"/>
-          <p:cNvSpPr>
-            <a:spLocks noChangeAspect="1"/>
-          </p:cNvSpPr>
-          <p:nvPr/>
-        </p:nvSpPr>
-        <p:spPr>
-          <a:xfrm>
-            <a:off x="7735274" y="2997834"/>
-            <a:ext cx="266233" cy="266233"/>
-          </a:xfrm>
-          <a:prstGeom prst="ellipse">
-            <a:avLst/>
-          </a:prstGeom>
-          <a:solidFill>
-            <a:schemeClr val="accent1"/>
-          </a:solidFill>
-          <a:ln>
-            <a:solidFill>
-              <a:schemeClr val="accent1"/>
-            </a:solidFill>
-          </a:ln>
-        </p:spPr>
-        <p:style>
-          <a:lnRef idx="2">
-            <a:schemeClr val="accent1">
-              <a:shade val="50000"/>
-            </a:schemeClr>
-          </a:lnRef>
-          <a:fillRef idx="1">
-            <a:schemeClr val="accent1"/>
-          </a:fillRef>
-          <a:effectRef idx="0">
-            <a:schemeClr val="accent1"/>
-          </a:effectRef>
-          <a:fontRef idx="minor">
-            <a:schemeClr val="lt1"/>
-          </a:fontRef>
-        </p:style>
-        <p:txBody>
-          <a:bodyPr rtlCol="0" anchor="ctr"/>
-          <a:lstStyle/>
-          <a:p>
-            <a:pPr algn="ctr"/>
-            <a:endParaRPr lang="en-US"/>
-          </a:p>
-        </p:txBody>
-      </p:sp>
-      <p:sp>
-        <p:nvSpPr>
-          <p:cNvPr id="42" name="Oval 41"/>
-          <p:cNvSpPr>
-            <a:spLocks noChangeAspect="1"/>
-          </p:cNvSpPr>
-          <p:nvPr/>
-        </p:nvSpPr>
-        <p:spPr>
-          <a:xfrm>
-            <a:off x="10838073" y="2990073"/>
-            <a:ext cx="266233" cy="266233"/>
-          </a:xfrm>
-          <a:prstGeom prst="ellipse">
-            <a:avLst/>
-          </a:prstGeom>
-          <a:solidFill>
-            <a:schemeClr val="accent1"/>
-          </a:solidFill>
-          <a:ln>
-            <a:solidFill>
-              <a:schemeClr val="accent1"/>
-            </a:solidFill>
-          </a:ln>
-        </p:spPr>
-        <p:style>
-          <a:lnRef idx="2">
-            <a:schemeClr val="accent1">
-              <a:shade val="50000"/>
-            </a:schemeClr>
-          </a:lnRef>
-          <a:fillRef idx="1">
-            <a:schemeClr val="accent1"/>
-          </a:fillRef>
-          <a:effectRef idx="0">
-            <a:schemeClr val="accent1"/>
-          </a:effectRef>
-          <a:fontRef idx="minor">
-            <a:schemeClr val="lt1"/>
-          </a:fontRef>
-        </p:style>
-        <p:txBody>
-          <a:bodyPr rtlCol="0" anchor="ctr"/>
-          <a:lstStyle/>
-          <a:p>
-            <a:pPr algn="ctr"/>
-            <a:endParaRPr lang="en-US"/>
-          </a:p>
-        </p:txBody>
-      </p:sp>
-      <p:pic>
-        <p:nvPicPr>
-          <p:cNvPr id="2" name="Picture 1"/>
-          <p:cNvPicPr>
-            <a:picLocks noChangeAspect="1"/>
-          </p:cNvPicPr>
-          <p:nvPr/>
-        </p:nvPicPr>
-        <p:blipFill>
-          <a:blip r:embed="rId8"/>
-          <a:stretch>
-            <a:fillRect/>
-          </a:stretch>
-        </p:blipFill>
-        <p:spPr>
-          <a:xfrm>
-            <a:off x="2341562" y="4210492"/>
-            <a:ext cx="1653476" cy="615507"/>
-          </a:xfrm>
-          <a:prstGeom prst="rect">
-            <a:avLst/>
-          </a:prstGeom>
-        </p:spPr>
-      </p:pic>
-      <p:pic>
-        <p:nvPicPr>
-          <p:cNvPr id="4" name="Picture 3"/>
-          <p:cNvPicPr>
-            <a:picLocks noChangeAspect="1"/>
-          </p:cNvPicPr>
-          <p:nvPr/>
-        </p:nvPicPr>
-        <p:blipFill>
-          <a:blip r:embed="rId9"/>
-          <a:stretch>
-            <a:fillRect/>
-          </a:stretch>
-        </p:blipFill>
-        <p:spPr>
-          <a:xfrm>
-            <a:off x="4929900" y="4530717"/>
-            <a:ext cx="1118302" cy="634558"/>
-          </a:xfrm>
-          <a:prstGeom prst="rect">
-            <a:avLst/>
-          </a:prstGeom>
-        </p:spPr>
-      </p:pic>
-      <p:pic>
-        <p:nvPicPr>
-          <p:cNvPr id="5" name="Picture 4"/>
-          <p:cNvPicPr>
-            <a:picLocks noChangeAspect="1"/>
-          </p:cNvPicPr>
-          <p:nvPr/>
-        </p:nvPicPr>
-        <p:blipFill>
-          <a:blip r:embed="rId10"/>
-          <a:stretch>
-            <a:fillRect/>
-          </a:stretch>
-        </p:blipFill>
-        <p:spPr>
-          <a:xfrm>
-            <a:off x="6195193" y="4530717"/>
-            <a:ext cx="1162538" cy="643431"/>
-          </a:xfrm>
-          <a:prstGeom prst="rect">
-            <a:avLst/>
-          </a:prstGeom>
-        </p:spPr>
-      </p:pic>
-      <p:pic>
-        <p:nvPicPr>
-          <p:cNvPr id="8" name="Picture 7"/>
-          <p:cNvPicPr>
-            <a:picLocks noChangeAspect="1"/>
-          </p:cNvPicPr>
-          <p:nvPr/>
-        </p:nvPicPr>
-        <p:blipFill>
-          <a:blip r:embed="rId11"/>
-          <a:stretch>
-            <a:fillRect/>
-          </a:stretch>
-        </p:blipFill>
-        <p:spPr>
-          <a:xfrm>
-            <a:off x="1421626" y="5908238"/>
-            <a:ext cx="981317" cy="632971"/>
-          </a:xfrm>
-          <a:prstGeom prst="rect">
-            <a:avLst/>
-          </a:prstGeom>
-        </p:spPr>
-      </p:pic>
-      <p:pic>
-        <p:nvPicPr>
-          <p:cNvPr id="9" name="Picture 8"/>
-          <p:cNvPicPr>
-            <a:picLocks noChangeAspect="1"/>
-          </p:cNvPicPr>
-          <p:nvPr/>
-        </p:nvPicPr>
-        <p:blipFill>
-          <a:blip r:embed="rId12"/>
-          <a:stretch>
-            <a:fillRect/>
-          </a:stretch>
-        </p:blipFill>
-        <p:spPr>
-          <a:xfrm>
-            <a:off x="7687606" y="4520627"/>
-            <a:ext cx="1523862" cy="626852"/>
-          </a:xfrm>
-          <a:prstGeom prst="rect">
-            <a:avLst/>
-          </a:prstGeom>
-        </p:spPr>
-      </p:pic>
-    </p:spTree>
-    <p:extLst>
-      <p:ext uri="{BB962C8B-B14F-4D97-AF65-F5344CB8AC3E}">
-        <p14:creationId xmlns:p14="http://schemas.microsoft.com/office/powerpoint/2010/main" val="686497539"/>
       </p:ext>
     </p:extLst>
   </p:cSld>

</xml_diff>